<commit_message>
breaking down boxes in figure to show each software
</commit_message>
<xml_diff>
--- a/ModelSystemOverview.pptx
+++ b/ModelSystemOverview.pptx
@@ -109,7 +109,7 @@
   </p:defaultTextStyle>
   <p:extLst>
     <p:ext uri="{EFAFB233-063F-42B5-8137-9DF3F51BA10A}">
-      <p15:sldGuideLst xmlns:p15="http://schemas.microsoft.com/office/powerpoint/2012/main">
+      <p15:sldGuideLst xmlns:p15="http://schemas.microsoft.com/office/powerpoint/2012/main" xmlns="">
         <p15:guide id="1" orient="horz" pos="2160" userDrawn="1">
           <p15:clr>
             <a:srgbClr val="A4A3A4"/>
@@ -208,7 +208,7 @@
           <a:p>
             <a:fld id="{2D034D7C-93FE-4856-8878-E0A628F73112}" type="datetimeFigureOut">
               <a:rPr lang="en-US" smtClean="0"/>
-              <a:t>12/1/2017</a:t>
+              <a:t>1/26/2018</a:t>
             </a:fld>
             <a:endParaRPr lang="en-US"/>
           </a:p>
@@ -607,7 +607,7 @@
           <a:p>
             <a:fld id="{2F262403-307B-4BAD-8CA9-DC985D5AEB64}" type="datetimeFigureOut">
               <a:rPr lang="en-US" smtClean="0"/>
-              <a:t>12/1/2017</a:t>
+              <a:t>1/26/2018</a:t>
             </a:fld>
             <a:endParaRPr lang="en-US"/>
           </a:p>
@@ -777,7 +777,7 @@
           <a:p>
             <a:fld id="{2F262403-307B-4BAD-8CA9-DC985D5AEB64}" type="datetimeFigureOut">
               <a:rPr lang="en-US" smtClean="0"/>
-              <a:t>12/1/2017</a:t>
+              <a:t>1/26/2018</a:t>
             </a:fld>
             <a:endParaRPr lang="en-US"/>
           </a:p>
@@ -957,7 +957,7 @@
           <a:p>
             <a:fld id="{2F262403-307B-4BAD-8CA9-DC985D5AEB64}" type="datetimeFigureOut">
               <a:rPr lang="en-US" smtClean="0"/>
-              <a:t>12/1/2017</a:t>
+              <a:t>1/26/2018</a:t>
             </a:fld>
             <a:endParaRPr lang="en-US"/>
           </a:p>
@@ -1127,7 +1127,7 @@
           <a:p>
             <a:fld id="{2F262403-307B-4BAD-8CA9-DC985D5AEB64}" type="datetimeFigureOut">
               <a:rPr lang="en-US" smtClean="0"/>
-              <a:t>12/1/2017</a:t>
+              <a:t>1/26/2018</a:t>
             </a:fld>
             <a:endParaRPr lang="en-US"/>
           </a:p>
@@ -1373,7 +1373,7 @@
           <a:p>
             <a:fld id="{2F262403-307B-4BAD-8CA9-DC985D5AEB64}" type="datetimeFigureOut">
               <a:rPr lang="en-US" smtClean="0"/>
-              <a:t>12/1/2017</a:t>
+              <a:t>1/26/2018</a:t>
             </a:fld>
             <a:endParaRPr lang="en-US"/>
           </a:p>
@@ -1605,7 +1605,7 @@
           <a:p>
             <a:fld id="{2F262403-307B-4BAD-8CA9-DC985D5AEB64}" type="datetimeFigureOut">
               <a:rPr lang="en-US" smtClean="0"/>
-              <a:t>12/1/2017</a:t>
+              <a:t>1/26/2018</a:t>
             </a:fld>
             <a:endParaRPr lang="en-US"/>
           </a:p>
@@ -1972,7 +1972,7 @@
           <a:p>
             <a:fld id="{2F262403-307B-4BAD-8CA9-DC985D5AEB64}" type="datetimeFigureOut">
               <a:rPr lang="en-US" smtClean="0"/>
-              <a:t>12/1/2017</a:t>
+              <a:t>1/26/2018</a:t>
             </a:fld>
             <a:endParaRPr lang="en-US"/>
           </a:p>
@@ -2090,7 +2090,7 @@
           <a:p>
             <a:fld id="{2F262403-307B-4BAD-8CA9-DC985D5AEB64}" type="datetimeFigureOut">
               <a:rPr lang="en-US" smtClean="0"/>
-              <a:t>12/1/2017</a:t>
+              <a:t>1/26/2018</a:t>
             </a:fld>
             <a:endParaRPr lang="en-US"/>
           </a:p>
@@ -2185,7 +2185,7 @@
           <a:p>
             <a:fld id="{2F262403-307B-4BAD-8CA9-DC985D5AEB64}" type="datetimeFigureOut">
               <a:rPr lang="en-US" smtClean="0"/>
-              <a:t>12/1/2017</a:t>
+              <a:t>1/26/2018</a:t>
             </a:fld>
             <a:endParaRPr lang="en-US"/>
           </a:p>
@@ -2462,7 +2462,7 @@
           <a:p>
             <a:fld id="{2F262403-307B-4BAD-8CA9-DC985D5AEB64}" type="datetimeFigureOut">
               <a:rPr lang="en-US" smtClean="0"/>
-              <a:t>12/1/2017</a:t>
+              <a:t>1/26/2018</a:t>
             </a:fld>
             <a:endParaRPr lang="en-US"/>
           </a:p>
@@ -2715,7 +2715,7 @@
           <a:p>
             <a:fld id="{2F262403-307B-4BAD-8CA9-DC985D5AEB64}" type="datetimeFigureOut">
               <a:rPr lang="en-US" smtClean="0"/>
-              <a:t>12/1/2017</a:t>
+              <a:t>1/26/2018</a:t>
             </a:fld>
             <a:endParaRPr lang="en-US"/>
           </a:p>
@@ -2928,7 +2928,7 @@
           <a:p>
             <a:fld id="{2F262403-307B-4BAD-8CA9-DC985D5AEB64}" type="datetimeFigureOut">
               <a:rPr lang="en-US" smtClean="0"/>
-              <a:t>12/1/2017</a:t>
+              <a:t>1/26/2018</a:t>
             </a:fld>
             <a:endParaRPr lang="en-US"/>
           </a:p>
@@ -3342,7 +3342,7 @@
         <p:spPr>
           <a:xfrm>
             <a:off x="1654628" y="237505"/>
-            <a:ext cx="8937171" cy="970808"/>
+            <a:ext cx="8937171" cy="822960"/>
           </a:xfrm>
           <a:prstGeom prst="roundRect">
             <a:avLst/>
@@ -3388,8 +3388,8 @@
         </p:nvSpPr>
         <p:spPr>
           <a:xfrm>
-            <a:off x="1654628" y="1469569"/>
-            <a:ext cx="8937171" cy="1034143"/>
+            <a:off x="1654628" y="1259177"/>
+            <a:ext cx="8937171" cy="822960"/>
           </a:xfrm>
           <a:prstGeom prst="roundRect">
             <a:avLst/>
@@ -3449,8 +3449,8 @@
         </p:blipFill>
         <p:spPr>
           <a:xfrm>
-            <a:off x="955963" y="3124400"/>
-            <a:ext cx="1289463" cy="1289463"/>
+            <a:off x="1069251" y="2663156"/>
+            <a:ext cx="1005840" cy="1005840"/>
           </a:xfrm>
           <a:prstGeom prst="rect">
             <a:avLst/>
@@ -3465,8 +3465,8 @@
         </p:nvSpPr>
         <p:spPr>
           <a:xfrm>
-            <a:off x="490847" y="3042062"/>
-            <a:ext cx="2219696" cy="3539342"/>
+            <a:off x="490847" y="2580818"/>
+            <a:ext cx="2219696" cy="1508063"/>
           </a:xfrm>
           <a:prstGeom prst="roundRect">
             <a:avLst/>
@@ -3520,7 +3520,7 @@
           </p:cNvPicPr>
           <p:nvPr/>
         </p:nvPicPr>
-        <p:blipFill>
+        <p:blipFill rotWithShape="1">
           <a:blip r:embed="rId3">
             <a:extLst>
               <a:ext uri="{28A0092B-C50C-407E-A947-70E740481C1C}">
@@ -3528,14 +3528,13 @@
               </a:ext>
             </a:extLst>
           </a:blip>
-          <a:stretch>
-            <a:fillRect/>
-          </a:stretch>
+          <a:srcRect l="3730" t="3857" r="4473" b="4695"/>
+          <a:stretch/>
         </p:blipFill>
         <p:spPr>
           <a:xfrm>
-            <a:off x="3920105" y="3096891"/>
-            <a:ext cx="1344480" cy="1344480"/>
+            <a:off x="4074319" y="2677974"/>
+            <a:ext cx="1009678" cy="1005840"/>
           </a:xfrm>
           <a:prstGeom prst="rect">
             <a:avLst/>
@@ -3550,8 +3549,8 @@
         </p:nvSpPr>
         <p:spPr>
           <a:xfrm>
-            <a:off x="3477161" y="3042062"/>
-            <a:ext cx="2219696" cy="3539342"/>
+            <a:off x="3494346" y="2564985"/>
+            <a:ext cx="2219696" cy="1508760"/>
           </a:xfrm>
           <a:prstGeom prst="roundRect">
             <a:avLst/>
@@ -3605,8 +3604,8 @@
         </p:nvSpPr>
         <p:spPr>
           <a:xfrm>
-            <a:off x="6463475" y="3042062"/>
-            <a:ext cx="2219696" cy="3539342"/>
+            <a:off x="6463475" y="2580818"/>
+            <a:ext cx="2219696" cy="1508760"/>
           </a:xfrm>
           <a:prstGeom prst="roundRect">
             <a:avLst/>
@@ -3660,8 +3659,8 @@
         </p:nvSpPr>
         <p:spPr>
           <a:xfrm>
-            <a:off x="9449790" y="3026229"/>
-            <a:ext cx="2219696" cy="3539342"/>
+            <a:off x="9449790" y="2564985"/>
+            <a:ext cx="2219696" cy="1508760"/>
           </a:xfrm>
           <a:prstGeom prst="roundRect">
             <a:avLst/>
@@ -3715,7 +3714,7 @@
           </p:cNvPicPr>
           <p:nvPr/>
         </p:nvPicPr>
-        <p:blipFill>
+        <p:blipFill rotWithShape="1">
           <a:blip r:embed="rId4">
             <a:extLst>
               <a:ext uri="{28A0092B-C50C-407E-A947-70E740481C1C}">
@@ -3723,14 +3722,13 @@
               </a:ext>
             </a:extLst>
           </a:blip>
-          <a:stretch>
-            <a:fillRect/>
-          </a:stretch>
+          <a:srcRect l="4629" t="3857" r="2705" b="2959"/>
+          <a:stretch/>
         </p:blipFill>
         <p:spPr>
           <a:xfrm>
-            <a:off x="6901083" y="3096891"/>
-            <a:ext cx="1344480" cy="1344480"/>
+            <a:off x="7065169" y="2677974"/>
+            <a:ext cx="1000236" cy="1005840"/>
           </a:xfrm>
           <a:prstGeom prst="rect">
             <a:avLst/>
@@ -3759,8 +3757,8 @@
         </p:blipFill>
         <p:spPr>
           <a:xfrm>
-            <a:off x="9929724" y="3139218"/>
-            <a:ext cx="1259827" cy="1259827"/>
+            <a:off x="10043012" y="2677974"/>
+            <a:ext cx="1005840" cy="1005840"/>
           </a:xfrm>
           <a:prstGeom prst="rect">
             <a:avLst/>
@@ -3789,8 +3787,8 @@
         </p:blipFill>
         <p:spPr>
           <a:xfrm>
-            <a:off x="1960677" y="1540949"/>
-            <a:ext cx="891381" cy="891381"/>
+            <a:off x="1960677" y="1306281"/>
+            <a:ext cx="731520" cy="731520"/>
           </a:xfrm>
           <a:prstGeom prst="rect">
             <a:avLst/>
@@ -3819,8 +3817,8 @@
         </p:blipFill>
         <p:spPr>
           <a:xfrm>
-            <a:off x="1960677" y="307794"/>
-            <a:ext cx="872194" cy="872194"/>
+            <a:off x="1960677" y="283518"/>
+            <a:ext cx="731520" cy="731520"/>
           </a:xfrm>
           <a:prstGeom prst="rect">
             <a:avLst/>
@@ -3835,8 +3833,8 @@
         </p:nvSpPr>
         <p:spPr>
           <a:xfrm>
-            <a:off x="4960360" y="457128"/>
-            <a:ext cx="2271279" cy="523220"/>
+            <a:off x="4960360" y="400484"/>
+            <a:ext cx="2271279" cy="492443"/>
           </a:xfrm>
           <a:prstGeom prst="rect">
             <a:avLst/>
@@ -3850,10 +3848,10 @@
           <a:lstStyle/>
           <a:p>
             <a:r>
-              <a:rPr lang="en-US" sz="2800" b="1" dirty="0" smtClean="0"/>
+              <a:rPr lang="en-US" sz="2600" b="1" dirty="0" smtClean="0"/>
               <a:t>Web Interface</a:t>
             </a:r>
-            <a:endParaRPr lang="en-US" sz="2800" b="1" dirty="0"/>
+            <a:endParaRPr lang="en-US" sz="2600" b="1" dirty="0"/>
           </a:p>
         </p:txBody>
       </p:sp>
@@ -3865,8 +3863,8 @@
         </p:nvSpPr>
         <p:spPr>
           <a:xfrm>
-            <a:off x="3004457" y="1540949"/>
-            <a:ext cx="7434943" cy="830997"/>
+            <a:off x="3004457" y="1330557"/>
+            <a:ext cx="7434943" cy="769441"/>
           </a:xfrm>
           <a:prstGeom prst="rect">
             <a:avLst/>
@@ -3880,16 +3878,16 @@
           <a:lstStyle/>
           <a:p>
             <a:r>
-              <a:rPr lang="en-US" sz="2800" b="1" dirty="0" smtClean="0"/>
+              <a:rPr lang="en-US" sz="2600" b="1" dirty="0" smtClean="0"/>
               <a:t>Automated Water Supply Model (AWSM)</a:t>
             </a:r>
           </a:p>
           <a:p>
             <a:r>
-              <a:rPr lang="en-US" sz="2000" b="1" dirty="0" smtClean="0"/>
+              <a:rPr lang="en-US" b="1" dirty="0" smtClean="0"/>
               <a:t> - Streamline water supply forecasts</a:t>
             </a:r>
-            <a:endParaRPr lang="en-US" sz="2000" b="1" dirty="0"/>
+            <a:endParaRPr lang="en-US" b="1" dirty="0"/>
           </a:p>
         </p:txBody>
       </p:sp>
@@ -3901,8 +3899,8 @@
         </p:nvSpPr>
         <p:spPr>
           <a:xfrm>
-            <a:off x="490847" y="4528878"/>
-            <a:ext cx="2219696" cy="1969770"/>
+            <a:off x="485183" y="3657994"/>
+            <a:ext cx="2219696" cy="430887"/>
           </a:xfrm>
           <a:prstGeom prst="rect">
             <a:avLst/>
@@ -3917,21 +3915,46 @@
           <a:p>
             <a:pPr algn="ctr"/>
             <a:r>
-              <a:rPr lang="en-US" sz="2400" b="1" dirty="0" smtClean="0"/>
-              <a:t>Weather Inputs</a:t>
-            </a:r>
-          </a:p>
-          <a:p>
-            <a:endParaRPr lang="en-US" b="1" dirty="0" smtClean="0"/>
-          </a:p>
+              <a:rPr lang="en-US" sz="2200" b="1" dirty="0" smtClean="0"/>
+              <a:t>Data</a:t>
+            </a:r>
+            <a:endParaRPr lang="en-US" sz="2200" b="1" dirty="0" smtClean="0"/>
+          </a:p>
+        </p:txBody>
+      </p:sp>
+      <p:sp>
+        <p:nvSpPr>
+          <p:cNvPr id="21" name="TextBox 20"/>
+          <p:cNvSpPr txBox="1"/>
+          <p:nvPr/>
+        </p:nvSpPr>
+        <p:spPr>
+          <a:xfrm>
+            <a:off x="3494346" y="4614828"/>
+            <a:ext cx="2219696" cy="1400383"/>
+          </a:xfrm>
+          <a:prstGeom prst="rect">
+            <a:avLst/>
+          </a:prstGeom>
+          <a:noFill/>
+        </p:spPr>
+        <p:txBody>
+          <a:bodyPr wrap="square" rtlCol="0">
+            <a:spAutoFit/>
+          </a:bodyPr>
+          <a:lstStyle/>
           <a:p>
             <a:pPr marL="282575" indent="-168275">
               <a:buFont typeface="Arial" panose="020B0604020202020204" pitchFamily="34" charset="0"/>
               <a:buChar char="•"/>
             </a:pPr>
             <a:r>
-              <a:rPr lang="en-US" sz="2000" b="1" dirty="0" smtClean="0"/>
-              <a:t>Station data</a:t>
+              <a:rPr lang="en-US" sz="1700" b="1" dirty="0" smtClean="0"/>
+              <a:t>Domain </a:t>
+            </a:r>
+            <a:r>
+              <a:rPr lang="en-US" sz="1700" b="1" dirty="0" smtClean="0"/>
+              <a:t>interpolation</a:t>
             </a:r>
           </a:p>
           <a:p>
@@ -3940,14 +3963,13 @@
               <a:buChar char="•"/>
             </a:pPr>
             <a:r>
-              <a:rPr lang="en-US" sz="2000" b="1" dirty="0" smtClean="0"/>
-              <a:t>WRF 10 day </a:t>
-            </a:r>
-            <a:r>
-              <a:rPr lang="en-US" sz="2000" b="1" dirty="0" err="1" smtClean="0"/>
-              <a:t>fx</a:t>
-            </a:r>
-            <a:endParaRPr lang="en-US" sz="2000" b="1" dirty="0" smtClean="0"/>
+              <a:rPr lang="en-US" sz="1700" b="1" dirty="0" smtClean="0"/>
+              <a:t>Point/gridded data to </a:t>
+            </a:r>
+            <a:r>
+              <a:rPr lang="en-US" sz="1700" b="1" dirty="0" smtClean="0"/>
+              <a:t>domain</a:t>
+            </a:r>
           </a:p>
           <a:p>
             <a:pPr marL="282575" indent="-168275">
@@ -3955,23 +3977,23 @@
               <a:buChar char="•"/>
             </a:pPr>
             <a:r>
-              <a:rPr lang="en-US" sz="2000" b="1" dirty="0" smtClean="0"/>
-              <a:t>Atmospheric models</a:t>
-            </a:r>
-            <a:endParaRPr lang="en-US" sz="2000" b="1" dirty="0"/>
-          </a:p>
-        </p:txBody>
-      </p:sp>
-      <p:sp>
-        <p:nvSpPr>
-          <p:cNvPr id="21" name="TextBox 20"/>
+              <a:rPr lang="en-US" sz="1700" b="1" dirty="0" smtClean="0"/>
+              <a:t>Flexible framework</a:t>
+            </a:r>
+            <a:endParaRPr lang="en-US" sz="1700" b="1" dirty="0" smtClean="0"/>
+          </a:p>
+        </p:txBody>
+      </p:sp>
+      <p:sp>
+        <p:nvSpPr>
+          <p:cNvPr id="22" name="TextBox 21"/>
           <p:cNvSpPr txBox="1"/>
           <p:nvPr/>
         </p:nvSpPr>
         <p:spPr>
           <a:xfrm>
-            <a:off x="3491015" y="4528878"/>
-            <a:ext cx="2219696" cy="1969770"/>
+            <a:off x="6491350" y="4594902"/>
+            <a:ext cx="2219696" cy="615553"/>
           </a:xfrm>
           <a:prstGeom prst="rect">
             <a:avLst/>
@@ -3984,27 +4006,13 @@
           </a:bodyPr>
           <a:lstStyle/>
           <a:p>
-            <a:pPr algn="ctr"/>
-            <a:r>
-              <a:rPr lang="en-US" sz="2400" b="1" dirty="0" smtClean="0"/>
-              <a:t>SMRF</a:t>
-            </a:r>
-          </a:p>
-          <a:p>
-            <a:endParaRPr lang="en-US" b="1" dirty="0" smtClean="0"/>
-          </a:p>
-          <a:p>
             <a:pPr marL="282575" indent="-168275">
               <a:buFont typeface="Arial" panose="020B0604020202020204" pitchFamily="34" charset="0"/>
               <a:buChar char="•"/>
             </a:pPr>
             <a:r>
-              <a:rPr lang="en-US" sz="2000" b="1" dirty="0"/>
-              <a:t>Domain </a:t>
-            </a:r>
-            <a:r>
-              <a:rPr lang="en-US" sz="2000" b="1" dirty="0" smtClean="0"/>
-              <a:t>interpolation</a:t>
+              <a:rPr lang="en-US" sz="1700" b="1" dirty="0" smtClean="0"/>
+              <a:t>Image processing</a:t>
             </a:r>
           </a:p>
           <a:p>
@@ -4013,22 +4021,23 @@
               <a:buChar char="•"/>
             </a:pPr>
             <a:r>
-              <a:rPr lang="en-US" sz="2000" b="1" dirty="0" smtClean="0"/>
-              <a:t>Point/gridded data to domain</a:t>
-            </a:r>
-          </a:p>
-        </p:txBody>
-      </p:sp>
-      <p:sp>
-        <p:nvSpPr>
-          <p:cNvPr id="22" name="TextBox 21"/>
+              <a:rPr lang="en-US" sz="1700" b="1" i="1" dirty="0" err="1" smtClean="0"/>
+              <a:t>iSnobal</a:t>
+            </a:r>
+            <a:endParaRPr lang="en-US" sz="1700" b="1" i="1" dirty="0"/>
+          </a:p>
+        </p:txBody>
+      </p:sp>
+      <p:sp>
+        <p:nvSpPr>
+          <p:cNvPr id="23" name="TextBox 22"/>
           <p:cNvSpPr txBox="1"/>
           <p:nvPr/>
         </p:nvSpPr>
         <p:spPr>
           <a:xfrm>
-            <a:off x="6491350" y="4528878"/>
-            <a:ext cx="2219696" cy="2277547"/>
+            <a:off x="9419307" y="4579662"/>
+            <a:ext cx="2219696" cy="1138773"/>
           </a:xfrm>
           <a:prstGeom prst="rect">
             <a:avLst/>
@@ -4041,24 +4050,17 @@
           </a:bodyPr>
           <a:lstStyle/>
           <a:p>
-            <a:pPr algn="ctr"/>
-            <a:r>
-              <a:rPr lang="en-US" sz="2400" b="1" dirty="0" err="1" smtClean="0"/>
-              <a:t>iSnobal</a:t>
-            </a:r>
-            <a:endParaRPr lang="en-US" sz="2400" b="1" dirty="0" smtClean="0"/>
-          </a:p>
-          <a:p>
-            <a:endParaRPr lang="en-US" b="1" dirty="0" smtClean="0"/>
-          </a:p>
-          <a:p>
             <a:pPr marL="282575" indent="-168275">
               <a:buFont typeface="Arial" panose="020B0604020202020204" pitchFamily="34" charset="0"/>
               <a:buChar char="•"/>
             </a:pPr>
             <a:r>
-              <a:rPr lang="en-US" sz="2000" b="1" dirty="0" smtClean="0"/>
-              <a:t>Snow and/or hydrologic model</a:t>
+              <a:rPr lang="en-US" sz="1700" b="1" dirty="0" smtClean="0"/>
+              <a:t>Process </a:t>
+            </a:r>
+            <a:r>
+              <a:rPr lang="en-US" sz="1700" b="1" dirty="0" smtClean="0"/>
+              <a:t>outputs</a:t>
             </a:r>
           </a:p>
           <a:p>
@@ -4067,8 +4069,12 @@
               <a:buChar char="•"/>
             </a:pPr>
             <a:r>
-              <a:rPr lang="en-US" sz="2000" b="1" dirty="0" smtClean="0"/>
-              <a:t>ASO integration</a:t>
+              <a:rPr lang="en-US" sz="1700" b="1" dirty="0" smtClean="0"/>
+              <a:t>Analytics and </a:t>
+            </a:r>
+            <a:r>
+              <a:rPr lang="en-US" sz="1700" b="1" dirty="0" smtClean="0"/>
+              <a:t>insights</a:t>
             </a:r>
           </a:p>
           <a:p>
@@ -4076,81 +4082,11 @@
               <a:buFont typeface="Arial" panose="020B0604020202020204" pitchFamily="34" charset="0"/>
               <a:buChar char="•"/>
             </a:pPr>
-            <a:endParaRPr lang="en-US" sz="2000" b="1" dirty="0"/>
-          </a:p>
-        </p:txBody>
-      </p:sp>
-      <p:sp>
-        <p:nvSpPr>
-          <p:cNvPr id="23" name="TextBox 22"/>
-          <p:cNvSpPr txBox="1"/>
-          <p:nvPr/>
-        </p:nvSpPr>
-        <p:spPr>
-          <a:xfrm>
-            <a:off x="9435935" y="4528878"/>
-            <a:ext cx="2219696" cy="2585323"/>
-          </a:xfrm>
-          <a:prstGeom prst="rect">
-            <a:avLst/>
-          </a:prstGeom>
-          <a:noFill/>
-        </p:spPr>
-        <p:txBody>
-          <a:bodyPr wrap="square" rtlCol="0">
-            <a:spAutoFit/>
-          </a:bodyPr>
-          <a:lstStyle/>
-          <a:p>
-            <a:pPr algn="ctr"/>
-            <a:r>
-              <a:rPr lang="en-US" sz="2400" b="1" dirty="0" smtClean="0"/>
-              <a:t>Data Analysis</a:t>
-            </a:r>
-          </a:p>
-          <a:p>
-            <a:endParaRPr lang="en-US" b="1" dirty="0" smtClean="0"/>
-          </a:p>
-          <a:p>
-            <a:pPr marL="282575" indent="-168275">
-              <a:buFont typeface="Arial" panose="020B0604020202020204" pitchFamily="34" charset="0"/>
-              <a:buChar char="•"/>
-            </a:pPr>
-            <a:r>
-              <a:rPr lang="en-US" sz="2000" b="1" dirty="0" smtClean="0"/>
-              <a:t>Process outputs</a:t>
-            </a:r>
-          </a:p>
-          <a:p>
-            <a:pPr marL="282575" indent="-168275">
-              <a:buFont typeface="Arial" panose="020B0604020202020204" pitchFamily="34" charset="0"/>
-              <a:buChar char="•"/>
-            </a:pPr>
-            <a:r>
-              <a:rPr lang="en-US" sz="2000" b="1" dirty="0" smtClean="0"/>
-              <a:t>Analytics and insights</a:t>
-            </a:r>
-          </a:p>
-          <a:p>
-            <a:pPr marL="282575" indent="-168275">
-              <a:buFont typeface="Arial" panose="020B0604020202020204" pitchFamily="34" charset="0"/>
-              <a:buChar char="•"/>
-            </a:pPr>
-            <a:endParaRPr lang="en-US" sz="2000" b="1" dirty="0" smtClean="0"/>
-          </a:p>
-          <a:p>
-            <a:pPr marL="282575" indent="-168275">
-              <a:buFont typeface="Arial" panose="020B0604020202020204" pitchFamily="34" charset="0"/>
-              <a:buChar char="•"/>
-            </a:pPr>
-            <a:endParaRPr lang="en-US" sz="2000" b="1" dirty="0" smtClean="0"/>
-          </a:p>
-          <a:p>
-            <a:pPr marL="282575" indent="-168275">
-              <a:buFont typeface="Arial" panose="020B0604020202020204" pitchFamily="34" charset="0"/>
-              <a:buChar char="•"/>
-            </a:pPr>
-            <a:endParaRPr lang="en-US" sz="2000" b="1" dirty="0"/>
+            <a:r>
+              <a:rPr lang="en-US" sz="1700" b="1" dirty="0" smtClean="0"/>
+              <a:t>Summary reports</a:t>
+            </a:r>
+            <a:endParaRPr lang="en-US" sz="1700" b="1" dirty="0" smtClean="0"/>
           </a:p>
         </p:txBody>
       </p:sp>
@@ -4162,8 +4098,8 @@
         </p:nvSpPr>
         <p:spPr>
           <a:xfrm>
-            <a:off x="239486" y="2797629"/>
-            <a:ext cx="11832771" cy="3929742"/>
+            <a:off x="239486" y="2352569"/>
+            <a:ext cx="11832771" cy="4363820"/>
           </a:xfrm>
           <a:prstGeom prst="rect">
             <a:avLst/>
@@ -4207,7 +4143,7 @@
         </p:nvSpPr>
         <p:spPr>
           <a:xfrm>
-            <a:off x="447303" y="2577332"/>
+            <a:off x="447303" y="2132272"/>
             <a:ext cx="2086982" cy="400110"/>
           </a:xfrm>
           <a:prstGeom prst="rect">
@@ -4316,6 +4252,763 @@
           <a:p>
             <a:pPr algn="ctr"/>
             <a:endParaRPr lang="en-US"/>
+          </a:p>
+        </p:txBody>
+      </p:sp>
+      <p:sp>
+        <p:nvSpPr>
+          <p:cNvPr id="26" name="TextBox 25"/>
+          <p:cNvSpPr txBox="1"/>
+          <p:nvPr/>
+        </p:nvSpPr>
+        <p:spPr>
+          <a:xfrm>
+            <a:off x="485183" y="4594902"/>
+            <a:ext cx="2219696" cy="615553"/>
+          </a:xfrm>
+          <a:prstGeom prst="rect">
+            <a:avLst/>
+          </a:prstGeom>
+          <a:noFill/>
+        </p:spPr>
+        <p:txBody>
+          <a:bodyPr wrap="square" rtlCol="0">
+            <a:spAutoFit/>
+          </a:bodyPr>
+          <a:lstStyle/>
+          <a:p>
+            <a:pPr marL="282575" indent="-168275">
+              <a:buFont typeface="Arial" panose="020B0604020202020204" pitchFamily="34" charset="0"/>
+              <a:buChar char="•"/>
+            </a:pPr>
+            <a:r>
+              <a:rPr lang="en-US" sz="1700" b="1" dirty="0" smtClean="0"/>
+              <a:t>Station data</a:t>
+            </a:r>
+          </a:p>
+          <a:p>
+            <a:pPr marL="282575" indent="-168275">
+              <a:buFont typeface="Arial" panose="020B0604020202020204" pitchFamily="34" charset="0"/>
+              <a:buChar char="•"/>
+            </a:pPr>
+            <a:r>
+              <a:rPr lang="en-US" sz="1700" b="1" dirty="0" smtClean="0"/>
+              <a:t>Auto cleaning</a:t>
+            </a:r>
+            <a:endParaRPr lang="en-US" sz="1700" b="1" dirty="0" smtClean="0"/>
+          </a:p>
+        </p:txBody>
+      </p:sp>
+      <p:sp>
+        <p:nvSpPr>
+          <p:cNvPr id="27" name="TextBox 26"/>
+          <p:cNvSpPr txBox="1"/>
+          <p:nvPr/>
+        </p:nvSpPr>
+        <p:spPr>
+          <a:xfrm>
+            <a:off x="3491015" y="3683814"/>
+            <a:ext cx="2219696" cy="430887"/>
+          </a:xfrm>
+          <a:prstGeom prst="rect">
+            <a:avLst/>
+          </a:prstGeom>
+          <a:noFill/>
+        </p:spPr>
+        <p:txBody>
+          <a:bodyPr wrap="square" rtlCol="0">
+            <a:spAutoFit/>
+          </a:bodyPr>
+          <a:lstStyle/>
+          <a:p>
+            <a:pPr algn="ctr"/>
+            <a:r>
+              <a:rPr lang="en-US" sz="2200" b="1" dirty="0" smtClean="0"/>
+              <a:t>SMRF</a:t>
+            </a:r>
+          </a:p>
+        </p:txBody>
+      </p:sp>
+      <p:sp>
+        <p:nvSpPr>
+          <p:cNvPr id="28" name="TextBox 27"/>
+          <p:cNvSpPr txBox="1"/>
+          <p:nvPr/>
+        </p:nvSpPr>
+        <p:spPr>
+          <a:xfrm>
+            <a:off x="6491350" y="3658691"/>
+            <a:ext cx="2219696" cy="430887"/>
+          </a:xfrm>
+          <a:prstGeom prst="rect">
+            <a:avLst/>
+          </a:prstGeom>
+          <a:noFill/>
+        </p:spPr>
+        <p:txBody>
+          <a:bodyPr wrap="square" rtlCol="0">
+            <a:spAutoFit/>
+          </a:bodyPr>
+          <a:lstStyle/>
+          <a:p>
+            <a:pPr algn="ctr"/>
+            <a:r>
+              <a:rPr lang="en-US" sz="2200" b="1" dirty="0" smtClean="0"/>
+              <a:t>Models</a:t>
+            </a:r>
+            <a:endParaRPr lang="en-US" sz="2200" b="1" dirty="0" smtClean="0"/>
+          </a:p>
+        </p:txBody>
+      </p:sp>
+      <p:sp>
+        <p:nvSpPr>
+          <p:cNvPr id="29" name="TextBox 28"/>
+          <p:cNvSpPr txBox="1"/>
+          <p:nvPr/>
+        </p:nvSpPr>
+        <p:spPr>
+          <a:xfrm>
+            <a:off x="9449790" y="3657993"/>
+            <a:ext cx="2219696" cy="430887"/>
+          </a:xfrm>
+          <a:prstGeom prst="rect">
+            <a:avLst/>
+          </a:prstGeom>
+          <a:noFill/>
+        </p:spPr>
+        <p:txBody>
+          <a:bodyPr wrap="square" rtlCol="0">
+            <a:spAutoFit/>
+          </a:bodyPr>
+          <a:lstStyle/>
+          <a:p>
+            <a:pPr algn="ctr"/>
+            <a:r>
+              <a:rPr lang="en-US" sz="2200" b="1" dirty="0" smtClean="0"/>
+              <a:t>Data Analysis</a:t>
+            </a:r>
+            <a:endParaRPr lang="en-US" sz="2200" b="1" dirty="0" smtClean="0"/>
+          </a:p>
+        </p:txBody>
+      </p:sp>
+      <p:sp>
+        <p:nvSpPr>
+          <p:cNvPr id="30" name="Rounded Rectangle 29"/>
+          <p:cNvSpPr/>
+          <p:nvPr/>
+        </p:nvSpPr>
+        <p:spPr>
+          <a:xfrm>
+            <a:off x="490847" y="4241282"/>
+            <a:ext cx="2219696" cy="1013256"/>
+          </a:xfrm>
+          <a:prstGeom prst="roundRect">
+            <a:avLst/>
+          </a:prstGeom>
+          <a:noFill/>
+          <a:ln w="38100" cap="flat" cmpd="sng" algn="ctr">
+            <a:solidFill>
+              <a:schemeClr val="dk1"/>
+            </a:solidFill>
+            <a:prstDash val="solid"/>
+            <a:round/>
+            <a:headEnd type="none" w="med" len="med"/>
+            <a:tailEnd type="none" w="med" len="med"/>
+          </a:ln>
+          <a:effectLst>
+            <a:outerShdw blurRad="50800" dist="38100" dir="2700000" algn="tl" rotWithShape="0">
+              <a:prstClr val="black">
+                <a:alpha val="40000"/>
+              </a:prstClr>
+            </a:outerShdw>
+          </a:effectLst>
+        </p:spPr>
+        <p:style>
+          <a:lnRef idx="0">
+            <a:scrgbClr r="0" g="0" b="0"/>
+          </a:lnRef>
+          <a:fillRef idx="0">
+            <a:scrgbClr r="0" g="0" b="0"/>
+          </a:fillRef>
+          <a:effectRef idx="0">
+            <a:scrgbClr r="0" g="0" b="0"/>
+          </a:effectRef>
+          <a:fontRef idx="minor">
+            <a:schemeClr val="dk1"/>
+          </a:fontRef>
+        </p:style>
+        <p:txBody>
+          <a:bodyPr rtlCol="0" anchor="ctr"/>
+          <a:lstStyle/>
+          <a:p>
+            <a:pPr algn="ctr"/>
+            <a:endParaRPr lang="en-US" dirty="0"/>
+          </a:p>
+        </p:txBody>
+      </p:sp>
+      <p:sp>
+        <p:nvSpPr>
+          <p:cNvPr id="32" name="TextBox 31"/>
+          <p:cNvSpPr txBox="1"/>
+          <p:nvPr/>
+        </p:nvSpPr>
+        <p:spPr>
+          <a:xfrm>
+            <a:off x="490847" y="5734912"/>
+            <a:ext cx="2219696" cy="877163"/>
+          </a:xfrm>
+          <a:prstGeom prst="rect">
+            <a:avLst/>
+          </a:prstGeom>
+          <a:noFill/>
+        </p:spPr>
+        <p:txBody>
+          <a:bodyPr wrap="square" rtlCol="0">
+            <a:spAutoFit/>
+          </a:bodyPr>
+          <a:lstStyle/>
+          <a:p>
+            <a:pPr marL="282575" indent="-168275">
+              <a:buFont typeface="Arial" panose="020B0604020202020204" pitchFamily="34" charset="0"/>
+              <a:buChar char="•"/>
+            </a:pPr>
+            <a:r>
+              <a:rPr lang="en-US" sz="1700" b="1" dirty="0" smtClean="0"/>
+              <a:t>WRF </a:t>
+            </a:r>
+            <a:r>
+              <a:rPr lang="en-US" sz="1700" b="1" dirty="0" smtClean="0"/>
+              <a:t>10 day </a:t>
+            </a:r>
+            <a:r>
+              <a:rPr lang="en-US" sz="1700" b="1" dirty="0" err="1" smtClean="0"/>
+              <a:t>fx</a:t>
+            </a:r>
+            <a:endParaRPr lang="en-US" sz="1700" b="1" dirty="0" smtClean="0"/>
+          </a:p>
+          <a:p>
+            <a:pPr marL="282575" indent="-168275">
+              <a:buFont typeface="Arial" panose="020B0604020202020204" pitchFamily="34" charset="0"/>
+              <a:buChar char="•"/>
+            </a:pPr>
+            <a:r>
+              <a:rPr lang="en-US" sz="1700" b="1" dirty="0" smtClean="0"/>
+              <a:t>Atmospheric models</a:t>
+            </a:r>
+            <a:endParaRPr lang="en-US" sz="1700" b="1" dirty="0"/>
+          </a:p>
+        </p:txBody>
+      </p:sp>
+      <p:sp>
+        <p:nvSpPr>
+          <p:cNvPr id="33" name="Rounded Rectangle 32"/>
+          <p:cNvSpPr/>
+          <p:nvPr/>
+        </p:nvSpPr>
+        <p:spPr>
+          <a:xfrm>
+            <a:off x="484566" y="5379720"/>
+            <a:ext cx="2219696" cy="1230677"/>
+          </a:xfrm>
+          <a:prstGeom prst="roundRect">
+            <a:avLst/>
+          </a:prstGeom>
+          <a:noFill/>
+          <a:ln w="38100" cap="flat" cmpd="sng" algn="ctr">
+            <a:solidFill>
+              <a:schemeClr val="dk1"/>
+            </a:solidFill>
+            <a:prstDash val="solid"/>
+            <a:round/>
+            <a:headEnd type="none" w="med" len="med"/>
+            <a:tailEnd type="none" w="med" len="med"/>
+          </a:ln>
+          <a:effectLst>
+            <a:outerShdw blurRad="50800" dist="38100" dir="2700000" algn="tl" rotWithShape="0">
+              <a:prstClr val="black">
+                <a:alpha val="40000"/>
+              </a:prstClr>
+            </a:outerShdw>
+          </a:effectLst>
+        </p:spPr>
+        <p:style>
+          <a:lnRef idx="0">
+            <a:scrgbClr r="0" g="0" b="0"/>
+          </a:lnRef>
+          <a:fillRef idx="0">
+            <a:scrgbClr r="0" g="0" b="0"/>
+          </a:fillRef>
+          <a:effectRef idx="0">
+            <a:scrgbClr r="0" g="0" b="0"/>
+          </a:effectRef>
+          <a:fontRef idx="minor">
+            <a:schemeClr val="dk1"/>
+          </a:fontRef>
+        </p:style>
+        <p:txBody>
+          <a:bodyPr rtlCol="0" anchor="ctr"/>
+          <a:lstStyle/>
+          <a:p>
+            <a:pPr algn="ctr"/>
+            <a:endParaRPr lang="en-US" dirty="0"/>
+          </a:p>
+        </p:txBody>
+      </p:sp>
+      <p:sp>
+        <p:nvSpPr>
+          <p:cNvPr id="34" name="TextBox 33"/>
+          <p:cNvSpPr txBox="1"/>
+          <p:nvPr/>
+        </p:nvSpPr>
+        <p:spPr>
+          <a:xfrm>
+            <a:off x="485183" y="4285935"/>
+            <a:ext cx="2219696" cy="400110"/>
+          </a:xfrm>
+          <a:prstGeom prst="rect">
+            <a:avLst/>
+          </a:prstGeom>
+          <a:noFill/>
+        </p:spPr>
+        <p:txBody>
+          <a:bodyPr wrap="square" rtlCol="0">
+            <a:spAutoFit/>
+          </a:bodyPr>
+          <a:lstStyle/>
+          <a:p>
+            <a:pPr algn="ctr"/>
+            <a:r>
+              <a:rPr lang="en-US" sz="2000" b="1" dirty="0" smtClean="0"/>
+              <a:t>Weather DB</a:t>
+            </a:r>
+            <a:endParaRPr lang="en-US" sz="2000" b="1" dirty="0" smtClean="0"/>
+          </a:p>
+        </p:txBody>
+      </p:sp>
+      <p:sp>
+        <p:nvSpPr>
+          <p:cNvPr id="35" name="TextBox 34"/>
+          <p:cNvSpPr txBox="1"/>
+          <p:nvPr/>
+        </p:nvSpPr>
+        <p:spPr>
+          <a:xfrm>
+            <a:off x="485183" y="5421315"/>
+            <a:ext cx="2219696" cy="400110"/>
+          </a:xfrm>
+          <a:prstGeom prst="rect">
+            <a:avLst/>
+          </a:prstGeom>
+          <a:noFill/>
+        </p:spPr>
+        <p:txBody>
+          <a:bodyPr wrap="square" rtlCol="0">
+            <a:spAutoFit/>
+          </a:bodyPr>
+          <a:lstStyle/>
+          <a:p>
+            <a:pPr algn="ctr"/>
+            <a:r>
+              <a:rPr lang="en-US" sz="2000" b="1" dirty="0" smtClean="0"/>
+              <a:t>Weather FX</a:t>
+            </a:r>
+            <a:endParaRPr lang="en-US" sz="2000" b="1" dirty="0" smtClean="0"/>
+          </a:p>
+        </p:txBody>
+      </p:sp>
+      <p:sp>
+        <p:nvSpPr>
+          <p:cNvPr id="36" name="Rounded Rectangle 35"/>
+          <p:cNvSpPr/>
+          <p:nvPr/>
+        </p:nvSpPr>
+        <p:spPr>
+          <a:xfrm>
+            <a:off x="3494346" y="4241282"/>
+            <a:ext cx="2219696" cy="1932211"/>
+          </a:xfrm>
+          <a:prstGeom prst="roundRect">
+            <a:avLst/>
+          </a:prstGeom>
+          <a:noFill/>
+          <a:ln w="38100" cap="flat" cmpd="sng" algn="ctr">
+            <a:solidFill>
+              <a:schemeClr val="tx1"/>
+            </a:solidFill>
+            <a:prstDash val="solid"/>
+            <a:round/>
+            <a:headEnd type="none" w="med" len="med"/>
+            <a:tailEnd type="none" w="med" len="med"/>
+          </a:ln>
+          <a:effectLst>
+            <a:outerShdw blurRad="50800" dist="38100" dir="2700000" algn="tl" rotWithShape="0">
+              <a:prstClr val="black">
+                <a:alpha val="40000"/>
+              </a:prstClr>
+            </a:outerShdw>
+          </a:effectLst>
+        </p:spPr>
+        <p:style>
+          <a:lnRef idx="0">
+            <a:scrgbClr r="0" g="0" b="0"/>
+          </a:lnRef>
+          <a:fillRef idx="0">
+            <a:scrgbClr r="0" g="0" b="0"/>
+          </a:fillRef>
+          <a:effectRef idx="0">
+            <a:scrgbClr r="0" g="0" b="0"/>
+          </a:effectRef>
+          <a:fontRef idx="minor">
+            <a:schemeClr val="dk1"/>
+          </a:fontRef>
+        </p:style>
+        <p:txBody>
+          <a:bodyPr rtlCol="0" anchor="ctr"/>
+          <a:lstStyle/>
+          <a:p>
+            <a:pPr algn="ctr"/>
+            <a:endParaRPr lang="en-US" dirty="0"/>
+          </a:p>
+        </p:txBody>
+      </p:sp>
+      <p:sp>
+        <p:nvSpPr>
+          <p:cNvPr id="37" name="TextBox 36"/>
+          <p:cNvSpPr txBox="1"/>
+          <p:nvPr/>
+        </p:nvSpPr>
+        <p:spPr>
+          <a:xfrm>
+            <a:off x="3494346" y="4285935"/>
+            <a:ext cx="2219696" cy="400110"/>
+          </a:xfrm>
+          <a:prstGeom prst="rect">
+            <a:avLst/>
+          </a:prstGeom>
+          <a:noFill/>
+        </p:spPr>
+        <p:txBody>
+          <a:bodyPr wrap="square" rtlCol="0">
+            <a:spAutoFit/>
+          </a:bodyPr>
+          <a:lstStyle/>
+          <a:p>
+            <a:pPr algn="ctr"/>
+            <a:r>
+              <a:rPr lang="en-US" sz="2000" b="1" dirty="0" smtClean="0"/>
+              <a:t>SMRF</a:t>
+            </a:r>
+            <a:endParaRPr lang="en-US" sz="2000" b="1" dirty="0" smtClean="0"/>
+          </a:p>
+        </p:txBody>
+      </p:sp>
+      <p:sp>
+        <p:nvSpPr>
+          <p:cNvPr id="38" name="Rounded Rectangle 37"/>
+          <p:cNvSpPr/>
+          <p:nvPr/>
+        </p:nvSpPr>
+        <p:spPr>
+          <a:xfrm>
+            <a:off x="6491350" y="4241978"/>
+            <a:ext cx="2219696" cy="1012560"/>
+          </a:xfrm>
+          <a:prstGeom prst="roundRect">
+            <a:avLst/>
+          </a:prstGeom>
+          <a:noFill/>
+          <a:ln w="38100" cap="flat" cmpd="sng" algn="ctr">
+            <a:solidFill>
+              <a:schemeClr val="dk1"/>
+            </a:solidFill>
+            <a:prstDash val="solid"/>
+            <a:round/>
+            <a:headEnd type="none" w="med" len="med"/>
+            <a:tailEnd type="none" w="med" len="med"/>
+          </a:ln>
+          <a:effectLst>
+            <a:outerShdw blurRad="50800" dist="38100" dir="2700000" algn="tl" rotWithShape="0">
+              <a:prstClr val="black">
+                <a:alpha val="40000"/>
+              </a:prstClr>
+            </a:outerShdw>
+          </a:effectLst>
+        </p:spPr>
+        <p:style>
+          <a:lnRef idx="0">
+            <a:scrgbClr r="0" g="0" b="0"/>
+          </a:lnRef>
+          <a:fillRef idx="0">
+            <a:scrgbClr r="0" g="0" b="0"/>
+          </a:fillRef>
+          <a:effectRef idx="0">
+            <a:scrgbClr r="0" g="0" b="0"/>
+          </a:effectRef>
+          <a:fontRef idx="minor">
+            <a:schemeClr val="dk1"/>
+          </a:fontRef>
+        </p:style>
+        <p:txBody>
+          <a:bodyPr rtlCol="0" anchor="ctr"/>
+          <a:lstStyle/>
+          <a:p>
+            <a:pPr algn="ctr"/>
+            <a:endParaRPr lang="en-US" dirty="0"/>
+          </a:p>
+        </p:txBody>
+      </p:sp>
+      <p:sp>
+        <p:nvSpPr>
+          <p:cNvPr id="39" name="TextBox 38"/>
+          <p:cNvSpPr txBox="1"/>
+          <p:nvPr/>
+        </p:nvSpPr>
+        <p:spPr>
+          <a:xfrm>
+            <a:off x="6491350" y="4285935"/>
+            <a:ext cx="2219696" cy="400110"/>
+          </a:xfrm>
+          <a:prstGeom prst="rect">
+            <a:avLst/>
+          </a:prstGeom>
+          <a:noFill/>
+        </p:spPr>
+        <p:txBody>
+          <a:bodyPr wrap="square" rtlCol="0">
+            <a:spAutoFit/>
+          </a:bodyPr>
+          <a:lstStyle/>
+          <a:p>
+            <a:pPr algn="ctr"/>
+            <a:r>
+              <a:rPr lang="en-US" sz="2000" b="1" dirty="0" smtClean="0"/>
+              <a:t>IPW</a:t>
+            </a:r>
+            <a:endParaRPr lang="en-US" sz="2000" b="1" dirty="0" smtClean="0"/>
+          </a:p>
+        </p:txBody>
+      </p:sp>
+      <p:sp>
+        <p:nvSpPr>
+          <p:cNvPr id="40" name="TextBox 39"/>
+          <p:cNvSpPr txBox="1"/>
+          <p:nvPr/>
+        </p:nvSpPr>
+        <p:spPr>
+          <a:xfrm>
+            <a:off x="6463475" y="5716902"/>
+            <a:ext cx="2219696" cy="877163"/>
+          </a:xfrm>
+          <a:prstGeom prst="rect">
+            <a:avLst/>
+          </a:prstGeom>
+          <a:noFill/>
+        </p:spPr>
+        <p:txBody>
+          <a:bodyPr wrap="square" rtlCol="0">
+            <a:spAutoFit/>
+          </a:bodyPr>
+          <a:lstStyle/>
+          <a:p>
+            <a:pPr marL="282575" indent="-168275">
+              <a:buFont typeface="Arial" panose="020B0604020202020204" pitchFamily="34" charset="0"/>
+              <a:buChar char="•"/>
+            </a:pPr>
+            <a:r>
+              <a:rPr lang="en-US" sz="1700" b="1" dirty="0" smtClean="0"/>
+              <a:t>Snow </a:t>
+            </a:r>
+            <a:r>
+              <a:rPr lang="en-US" sz="1700" b="1" dirty="0" smtClean="0"/>
+              <a:t>and/or hydrologic model</a:t>
+            </a:r>
+          </a:p>
+          <a:p>
+            <a:pPr marL="282575" indent="-168275">
+              <a:buFont typeface="Arial" panose="020B0604020202020204" pitchFamily="34" charset="0"/>
+              <a:buChar char="•"/>
+            </a:pPr>
+            <a:r>
+              <a:rPr lang="en-US" sz="1700" b="1" dirty="0" smtClean="0"/>
+              <a:t>ASO </a:t>
+            </a:r>
+            <a:r>
+              <a:rPr lang="en-US" sz="1700" b="1" dirty="0" smtClean="0"/>
+              <a:t>integration</a:t>
+            </a:r>
+            <a:endParaRPr lang="en-US" b="1" dirty="0"/>
+          </a:p>
+        </p:txBody>
+      </p:sp>
+      <p:sp>
+        <p:nvSpPr>
+          <p:cNvPr id="41" name="Rounded Rectangle 40"/>
+          <p:cNvSpPr/>
+          <p:nvPr/>
+        </p:nvSpPr>
+        <p:spPr>
+          <a:xfrm>
+            <a:off x="6491350" y="5357573"/>
+            <a:ext cx="2219696" cy="1274969"/>
+          </a:xfrm>
+          <a:prstGeom prst="roundRect">
+            <a:avLst/>
+          </a:prstGeom>
+          <a:noFill/>
+          <a:ln w="38100" cap="flat" cmpd="sng" algn="ctr">
+            <a:solidFill>
+              <a:schemeClr val="dk1"/>
+            </a:solidFill>
+            <a:prstDash val="solid"/>
+            <a:round/>
+            <a:headEnd type="none" w="med" len="med"/>
+            <a:tailEnd type="none" w="med" len="med"/>
+          </a:ln>
+          <a:effectLst>
+            <a:outerShdw blurRad="50800" dist="38100" dir="2700000" algn="tl" rotWithShape="0">
+              <a:prstClr val="black">
+                <a:alpha val="40000"/>
+              </a:prstClr>
+            </a:outerShdw>
+          </a:effectLst>
+        </p:spPr>
+        <p:style>
+          <a:lnRef idx="0">
+            <a:scrgbClr r="0" g="0" b="0"/>
+          </a:lnRef>
+          <a:fillRef idx="0">
+            <a:scrgbClr r="0" g="0" b="0"/>
+          </a:fillRef>
+          <a:effectRef idx="0">
+            <a:scrgbClr r="0" g="0" b="0"/>
+          </a:effectRef>
+          <a:fontRef idx="minor">
+            <a:schemeClr val="dk1"/>
+          </a:fontRef>
+        </p:style>
+        <p:txBody>
+          <a:bodyPr rtlCol="0" anchor="ctr"/>
+          <a:lstStyle/>
+          <a:p>
+            <a:pPr algn="ctr"/>
+            <a:endParaRPr lang="en-US" dirty="0"/>
+          </a:p>
+        </p:txBody>
+      </p:sp>
+      <p:sp>
+        <p:nvSpPr>
+          <p:cNvPr id="42" name="TextBox 41"/>
+          <p:cNvSpPr txBox="1"/>
+          <p:nvPr/>
+        </p:nvSpPr>
+        <p:spPr>
+          <a:xfrm>
+            <a:off x="6491350" y="5423368"/>
+            <a:ext cx="2219696" cy="400110"/>
+          </a:xfrm>
+          <a:prstGeom prst="rect">
+            <a:avLst/>
+          </a:prstGeom>
+          <a:noFill/>
+        </p:spPr>
+        <p:txBody>
+          <a:bodyPr wrap="square" rtlCol="0">
+            <a:spAutoFit/>
+          </a:bodyPr>
+          <a:lstStyle/>
+          <a:p>
+            <a:pPr algn="ctr"/>
+            <a:r>
+              <a:rPr lang="en-US" sz="2000" b="1" dirty="0" err="1" smtClean="0"/>
+              <a:t>PySnobal</a:t>
+            </a:r>
+            <a:endParaRPr lang="en-US" sz="2000" b="1" dirty="0" smtClean="0"/>
+          </a:p>
+        </p:txBody>
+      </p:sp>
+      <p:sp>
+        <p:nvSpPr>
+          <p:cNvPr id="44" name="Rounded Rectangle 43"/>
+          <p:cNvSpPr/>
+          <p:nvPr/>
+        </p:nvSpPr>
+        <p:spPr>
+          <a:xfrm>
+            <a:off x="9449790" y="4241978"/>
+            <a:ext cx="2219696" cy="1508760"/>
+          </a:xfrm>
+          <a:prstGeom prst="roundRect">
+            <a:avLst/>
+          </a:prstGeom>
+          <a:noFill/>
+          <a:ln w="38100" cap="flat" cmpd="sng" algn="ctr">
+            <a:solidFill>
+              <a:schemeClr val="dk1"/>
+            </a:solidFill>
+            <a:prstDash val="solid"/>
+            <a:round/>
+            <a:headEnd type="none" w="med" len="med"/>
+            <a:tailEnd type="none" w="med" len="med"/>
+          </a:ln>
+          <a:effectLst>
+            <a:outerShdw blurRad="50800" dist="38100" dir="2700000" algn="tl" rotWithShape="0">
+              <a:prstClr val="black">
+                <a:alpha val="40000"/>
+              </a:prstClr>
+            </a:outerShdw>
+          </a:effectLst>
+        </p:spPr>
+        <p:style>
+          <a:lnRef idx="0">
+            <a:scrgbClr r="0" g="0" b="0"/>
+          </a:lnRef>
+          <a:fillRef idx="0">
+            <a:scrgbClr r="0" g="0" b="0"/>
+          </a:fillRef>
+          <a:effectRef idx="0">
+            <a:scrgbClr r="0" g="0" b="0"/>
+          </a:effectRef>
+          <a:fontRef idx="minor">
+            <a:schemeClr val="dk1"/>
+          </a:fontRef>
+        </p:style>
+        <p:txBody>
+          <a:bodyPr rtlCol="0" anchor="ctr"/>
+          <a:lstStyle/>
+          <a:p>
+            <a:pPr algn="ctr"/>
+            <a:endParaRPr lang="en-US" dirty="0"/>
+          </a:p>
+        </p:txBody>
+      </p:sp>
+      <p:sp>
+        <p:nvSpPr>
+          <p:cNvPr id="45" name="TextBox 44"/>
+          <p:cNvSpPr txBox="1"/>
+          <p:nvPr/>
+        </p:nvSpPr>
+        <p:spPr>
+          <a:xfrm>
+            <a:off x="9449790" y="4285935"/>
+            <a:ext cx="2219696" cy="400110"/>
+          </a:xfrm>
+          <a:prstGeom prst="rect">
+            <a:avLst/>
+          </a:prstGeom>
+          <a:noFill/>
+        </p:spPr>
+        <p:txBody>
+          <a:bodyPr wrap="square" rtlCol="0">
+            <a:spAutoFit/>
+          </a:bodyPr>
+          <a:lstStyle/>
+          <a:p>
+            <a:pPr algn="ctr"/>
+            <a:r>
+              <a:rPr lang="en-US" sz="2000" b="1" dirty="0" smtClean="0"/>
+              <a:t>SNOWAV</a:t>
+            </a:r>
+            <a:endParaRPr lang="en-US" sz="2000" b="1" dirty="0" smtClean="0"/>
           </a:p>
         </p:txBody>
       </p:sp>
@@ -4382,7 +5075,7 @@
     </a:clrScheme>
     <a:fontScheme name="Office">
       <a:majorFont>
-        <a:latin typeface="Calibri Light" panose="020F0302020204030204"/>
+        <a:latin typeface="Calibri Light"/>
         <a:ea typeface=""/>
         <a:cs typeface=""/>
         <a:font script="Jpan" typeface="游ゴシック Light"/>
@@ -4417,7 +5110,7 @@
         <a:font script="Geor" typeface="Sylfaen"/>
       </a:majorFont>
       <a:minorFont>
-        <a:latin typeface="Calibri" panose="020F0502020204030204"/>
+        <a:latin typeface="Calibri"/>
         <a:ea typeface=""/>
         <a:cs typeface=""/>
         <a:font script="Jpan" typeface="游ゴシック"/>
@@ -4594,7 +5287,7 @@
   <a:extraClrSchemeLst/>
   <a:extLst>
     <a:ext uri="{05A4C25C-085E-4340-85A3-A5531E510DB2}">
-      <thm15:themeFamily xmlns:thm15="http://schemas.microsoft.com/office/thememl/2012/main" name="Office Theme" id="{62F939B6-93AF-4DB8-9C6B-D6C7DFDC589F}" vid="{4A3C46E8-61CC-4603-A589-7422A47A8E4A}"/>
+      <thm15:themeFamily xmlns:thm15="http://schemas.microsoft.com/office/thememl/2012/main" xmlns="" name="Office Theme" id="{62F939B6-93AF-4DB8-9C6B-D6C7DFDC589F}" vid="{4A3C46E8-61CC-4603-A589-7422A47A8E4A}"/>
     </a:ext>
   </a:extLst>
 </a:theme>
@@ -4643,7 +5336,7 @@
     </a:clrScheme>
     <a:fontScheme name="Office">
       <a:majorFont>
-        <a:latin typeface="Calibri Light" panose="020F0302020204030204"/>
+        <a:latin typeface="Calibri Light"/>
         <a:ea typeface=""/>
         <a:cs typeface=""/>
         <a:font script="Jpan" typeface="游ゴシック Light"/>
@@ -4678,7 +5371,7 @@
         <a:font script="Geor" typeface="Sylfaen"/>
       </a:majorFont>
       <a:minorFont>
-        <a:latin typeface="Calibri" panose="020F0502020204030204"/>
+        <a:latin typeface="Calibri"/>
         <a:ea typeface=""/>
         <a:cs typeface=""/>
         <a:font script="Jpan" typeface="游ゴシック"/>
@@ -4855,7 +5548,7 @@
   <a:extraClrSchemeLst/>
   <a:extLst>
     <a:ext uri="{05A4C25C-085E-4340-85A3-A5531E510DB2}">
-      <thm15:themeFamily xmlns:thm15="http://schemas.microsoft.com/office/thememl/2012/main" name="Office Theme" id="{62F939B6-93AF-4DB8-9C6B-D6C7DFDC589F}" vid="{4A3C46E8-61CC-4603-A589-7422A47A8E4A}"/>
+      <thm15:themeFamily xmlns:thm15="http://schemas.microsoft.com/office/thememl/2012/main" xmlns="" name="Office Theme" id="{62F939B6-93AF-4DB8-9C6B-D6C7DFDC589F}" vid="{4A3C46E8-61CC-4603-A589-7422A47A8E4A}"/>
     </a:ext>
   </a:extLst>
 </a:theme>

</xml_diff>

<commit_message>
some more formatting, moved ASO integration up to the awsm box
</commit_message>
<xml_diff>
--- a/ModelSystemOverview.pptx
+++ b/ModelSystemOverview.pptx
@@ -109,7 +109,7 @@
   </p:defaultTextStyle>
   <p:extLst>
     <p:ext uri="{EFAFB233-063F-42B5-8137-9DF3F51BA10A}">
-      <p15:sldGuideLst xmlns:p15="http://schemas.microsoft.com/office/powerpoint/2012/main" xmlns="">
+      <p15:sldGuideLst xmlns="" xmlns:p15="http://schemas.microsoft.com/office/powerpoint/2012/main">
         <p15:guide id="1" orient="horz" pos="2160" userDrawn="1">
           <p15:clr>
             <a:srgbClr val="A4A3A4"/>
@@ -3335,37 +3335,182 @@
       </p:grpSpPr>
       <p:sp>
         <p:nvSpPr>
-          <p:cNvPr id="4" name="Rounded Rectangle 3"/>
+          <p:cNvPr id="47" name="Rounded Rectangle 46"/>
           <p:cNvSpPr/>
           <p:nvPr/>
         </p:nvSpPr>
         <p:spPr>
           <a:xfrm>
-            <a:off x="1654628" y="237505"/>
-            <a:ext cx="8937171" cy="822960"/>
+            <a:off x="3324034" y="2561886"/>
+            <a:ext cx="2560320" cy="3687807"/>
           </a:xfrm>
           <a:prstGeom prst="roundRect">
             <a:avLst/>
           </a:prstGeom>
-          <a:noFill/>
-          <a:ln w="28575"/>
-          <a:effectLst>
-            <a:outerShdw blurRad="50800" dist="38100" dir="2700000" algn="tl" rotWithShape="0">
-              <a:prstClr val="black">
-                <a:alpha val="40000"/>
-              </a:prstClr>
-            </a:outerShdw>
-          </a:effectLst>
+          <a:solidFill>
+            <a:schemeClr val="bg2">
+              <a:lumMod val="90000"/>
+              <a:alpha val="50000"/>
+            </a:schemeClr>
+          </a:solidFill>
+          <a:ln>
+            <a:noFill/>
+          </a:ln>
         </p:spPr>
         <p:style>
           <a:lnRef idx="2">
-            <a:schemeClr val="dk1"/>
+            <a:schemeClr val="accent1">
+              <a:shade val="50000"/>
+            </a:schemeClr>
+          </a:lnRef>
+          <a:fillRef idx="1">
+            <a:schemeClr val="accent1"/>
+          </a:fillRef>
+          <a:effectRef idx="0">
+            <a:schemeClr val="accent1"/>
+          </a:effectRef>
+          <a:fontRef idx="minor">
+            <a:schemeClr val="lt1"/>
+          </a:fontRef>
+        </p:style>
+        <p:txBody>
+          <a:bodyPr rtlCol="0" anchor="ctr"/>
+          <a:lstStyle/>
+          <a:p>
+            <a:pPr algn="ctr"/>
+            <a:endParaRPr lang="en-US"/>
+          </a:p>
+        </p:txBody>
+      </p:sp>
+      <p:sp>
+        <p:nvSpPr>
+          <p:cNvPr id="48" name="Rounded Rectangle 47"/>
+          <p:cNvSpPr/>
+          <p:nvPr/>
+        </p:nvSpPr>
+        <p:spPr>
+          <a:xfrm>
+            <a:off x="6286309" y="2580936"/>
+            <a:ext cx="2560320" cy="4105661"/>
+          </a:xfrm>
+          <a:prstGeom prst="roundRect">
+            <a:avLst/>
+          </a:prstGeom>
+          <a:solidFill>
+            <a:schemeClr val="bg2">
+              <a:lumMod val="90000"/>
+              <a:alpha val="50000"/>
+            </a:schemeClr>
+          </a:solidFill>
+          <a:ln>
+            <a:noFill/>
+          </a:ln>
+        </p:spPr>
+        <p:style>
+          <a:lnRef idx="2">
+            <a:schemeClr val="accent1">
+              <a:shade val="50000"/>
+            </a:schemeClr>
+          </a:lnRef>
+          <a:fillRef idx="1">
+            <a:schemeClr val="accent1"/>
+          </a:fillRef>
+          <a:effectRef idx="0">
+            <a:schemeClr val="accent1"/>
+          </a:effectRef>
+          <a:fontRef idx="minor">
+            <a:schemeClr val="lt1"/>
+          </a:fontRef>
+        </p:style>
+        <p:txBody>
+          <a:bodyPr rtlCol="0" anchor="ctr"/>
+          <a:lstStyle/>
+          <a:p>
+            <a:pPr algn="ctr"/>
+            <a:endParaRPr lang="en-US"/>
+          </a:p>
+        </p:txBody>
+      </p:sp>
+      <p:sp>
+        <p:nvSpPr>
+          <p:cNvPr id="49" name="Rounded Rectangle 48"/>
+          <p:cNvSpPr/>
+          <p:nvPr/>
+        </p:nvSpPr>
+        <p:spPr>
+          <a:xfrm>
+            <a:off x="9258109" y="2580937"/>
+            <a:ext cx="2560320" cy="3364090"/>
+          </a:xfrm>
+          <a:prstGeom prst="roundRect">
+            <a:avLst/>
+          </a:prstGeom>
+          <a:solidFill>
+            <a:schemeClr val="bg2">
+              <a:lumMod val="90000"/>
+              <a:alpha val="50000"/>
+            </a:schemeClr>
+          </a:solidFill>
+          <a:ln>
+            <a:noFill/>
+          </a:ln>
+        </p:spPr>
+        <p:style>
+          <a:lnRef idx="2">
+            <a:schemeClr val="accent1">
+              <a:shade val="50000"/>
+            </a:schemeClr>
+          </a:lnRef>
+          <a:fillRef idx="1">
+            <a:schemeClr val="accent1"/>
+          </a:fillRef>
+          <a:effectRef idx="0">
+            <a:schemeClr val="accent1"/>
+          </a:effectRef>
+          <a:fontRef idx="minor">
+            <a:schemeClr val="lt1"/>
+          </a:fontRef>
+        </p:style>
+        <p:txBody>
+          <a:bodyPr rtlCol="0" anchor="ctr"/>
+          <a:lstStyle/>
+          <a:p>
+            <a:pPr algn="ctr"/>
+            <a:endParaRPr lang="en-US"/>
+          </a:p>
+        </p:txBody>
+      </p:sp>
+      <p:sp>
+        <p:nvSpPr>
+          <p:cNvPr id="24" name="Rectangle 23"/>
+          <p:cNvSpPr/>
+          <p:nvPr/>
+        </p:nvSpPr>
+        <p:spPr>
+          <a:xfrm>
+            <a:off x="239486" y="2447819"/>
+            <a:ext cx="11832771" cy="4363820"/>
+          </a:xfrm>
+          <a:prstGeom prst="rect">
+            <a:avLst/>
+          </a:prstGeom>
+          <a:noFill/>
+          <a:ln w="38100">
+            <a:solidFill>
+              <a:srgbClr val="C00000"/>
+            </a:solidFill>
+            <a:prstDash val="dash"/>
+          </a:ln>
+        </p:spPr>
+        <p:style>
+          <a:lnRef idx="2">
+            <a:schemeClr val="accent2"/>
           </a:lnRef>
           <a:fillRef idx="1">
             <a:schemeClr val="lt1"/>
           </a:fillRef>
           <a:effectRef idx="0">
-            <a:schemeClr val="dk1"/>
+            <a:schemeClr val="accent2"/>
           </a:effectRef>
           <a:fontRef idx="minor">
             <a:schemeClr val="dk1"/>
@@ -3376,19 +3521,108 @@
           <a:lstStyle/>
           <a:p>
             <a:pPr algn="ctr"/>
-            <a:endParaRPr lang="en-US" sz="2400" b="1" dirty="0"/>
-          </a:p>
-        </p:txBody>
-      </p:sp>
-      <p:sp>
-        <p:nvSpPr>
-          <p:cNvPr id="5" name="Rounded Rectangle 4"/>
+            <a:endParaRPr lang="en-US" dirty="0"/>
+          </a:p>
+        </p:txBody>
+      </p:sp>
+      <p:sp>
+        <p:nvSpPr>
+          <p:cNvPr id="25" name="TextBox 24"/>
+          <p:cNvSpPr txBox="1"/>
+          <p:nvPr/>
+        </p:nvSpPr>
+        <p:spPr>
+          <a:xfrm>
+            <a:off x="447303" y="2227522"/>
+            <a:ext cx="2086982" cy="400110"/>
+          </a:xfrm>
+          <a:prstGeom prst="rect">
+            <a:avLst/>
+          </a:prstGeom>
+          <a:solidFill>
+            <a:schemeClr val="bg1"/>
+          </a:solidFill>
+        </p:spPr>
+        <p:txBody>
+          <a:bodyPr wrap="none" rtlCol="0">
+            <a:spAutoFit/>
+          </a:bodyPr>
+          <a:lstStyle/>
+          <a:p>
+            <a:r>
+              <a:rPr lang="en-US" sz="2000" b="1" dirty="0" smtClean="0">
+                <a:solidFill>
+                  <a:srgbClr val="C00000"/>
+                </a:solidFill>
+              </a:rPr>
+              <a:t>Core Components</a:t>
+            </a:r>
+            <a:endParaRPr lang="en-US" sz="2000" b="1" dirty="0">
+              <a:solidFill>
+                <a:srgbClr val="C00000"/>
+              </a:solidFill>
+            </a:endParaRPr>
+          </a:p>
+        </p:txBody>
+      </p:sp>
+      <p:sp>
+        <p:nvSpPr>
+          <p:cNvPr id="46" name="Rounded Rectangle 45"/>
           <p:cNvSpPr/>
           <p:nvPr/>
         </p:nvSpPr>
         <p:spPr>
           <a:xfrm>
-            <a:off x="1654628" y="1259177"/>
+            <a:off x="331965" y="2564809"/>
+            <a:ext cx="2560320" cy="4187952"/>
+          </a:xfrm>
+          <a:prstGeom prst="roundRect">
+            <a:avLst/>
+          </a:prstGeom>
+          <a:solidFill>
+            <a:schemeClr val="bg2">
+              <a:lumMod val="90000"/>
+              <a:alpha val="50000"/>
+            </a:schemeClr>
+          </a:solidFill>
+          <a:ln>
+            <a:noFill/>
+          </a:ln>
+        </p:spPr>
+        <p:style>
+          <a:lnRef idx="2">
+            <a:schemeClr val="accent1">
+              <a:shade val="50000"/>
+            </a:schemeClr>
+          </a:lnRef>
+          <a:fillRef idx="1">
+            <a:schemeClr val="accent1"/>
+          </a:fillRef>
+          <a:effectRef idx="0">
+            <a:schemeClr val="accent1"/>
+          </a:effectRef>
+          <a:fontRef idx="minor">
+            <a:schemeClr val="lt1"/>
+          </a:fontRef>
+        </p:style>
+        <p:txBody>
+          <a:bodyPr rtlCol="0" anchor="ctr"/>
+          <a:lstStyle/>
+          <a:p>
+            <a:pPr algn="ctr"/>
+            <a:endParaRPr lang="en-US"/>
+          </a:p>
+        </p:txBody>
+      </p:sp>
+      <p:sp>
+        <p:nvSpPr>
+          <p:cNvPr id="4" name="Rounded Rectangle 3"/>
+          <p:cNvSpPr/>
+          <p:nvPr/>
+        </p:nvSpPr>
+        <p:spPr>
+          <a:xfrm>
+            <a:off x="1654628" y="237505"/>
             <a:ext cx="8937171" cy="822960"/>
           </a:xfrm>
           <a:prstGeom prst="roundRect">
@@ -3449,7 +3683,7 @@
         </p:blipFill>
         <p:spPr>
           <a:xfrm>
-            <a:off x="1069251" y="2663156"/>
+            <a:off x="1069251" y="2739356"/>
             <a:ext cx="1005840" cy="1005840"/>
           </a:xfrm>
           <a:prstGeom prst="rect">
@@ -3457,16 +3691,100 @@
           </a:prstGeom>
         </p:spPr>
       </p:pic>
-      <p:sp>
-        <p:nvSpPr>
-          <p:cNvPr id="8" name="Rounded Rectangle 7"/>
+      <p:pic>
+        <p:nvPicPr>
+          <p:cNvPr id="9" name="Picture 8"/>
+          <p:cNvPicPr>
+            <a:picLocks noChangeAspect="1"/>
+          </p:cNvPicPr>
+          <p:nvPr/>
+        </p:nvPicPr>
+        <p:blipFill rotWithShape="1">
+          <a:blip r:embed="rId3">
+            <a:extLst>
+              <a:ext uri="{28A0092B-C50C-407E-A947-70E740481C1C}">
+                <a14:useLocalDpi xmlns:a14="http://schemas.microsoft.com/office/drawing/2010/main" val="0"/>
+              </a:ext>
+            </a:extLst>
+          </a:blip>
+          <a:srcRect l="3730" t="3857" r="4473" b="4695"/>
+          <a:stretch/>
+        </p:blipFill>
+        <p:spPr>
+          <a:xfrm>
+            <a:off x="4074319" y="2754174"/>
+            <a:ext cx="1009678" cy="1005840"/>
+          </a:xfrm>
+          <a:prstGeom prst="ellipse">
+            <a:avLst/>
+          </a:prstGeom>
+        </p:spPr>
+      </p:pic>
+      <p:sp>
+        <p:nvSpPr>
+          <p:cNvPr id="10" name="Rounded Rectangle 9"/>
           <p:cNvSpPr/>
           <p:nvPr/>
         </p:nvSpPr>
         <p:spPr>
           <a:xfrm>
-            <a:off x="490847" y="2580818"/>
-            <a:ext cx="2219696" cy="1508063"/>
+            <a:off x="3494346" y="2641185"/>
+            <a:ext cx="2219696" cy="1508760"/>
+          </a:xfrm>
+          <a:prstGeom prst="roundRect">
+            <a:avLst/>
+          </a:prstGeom>
+          <a:noFill/>
+          <a:ln w="38100" cap="flat" cmpd="sng" algn="ctr">
+            <a:solidFill>
+              <a:schemeClr val="tx1"/>
+            </a:solidFill>
+            <a:prstDash val="solid"/>
+            <a:round/>
+            <a:headEnd type="none" w="med" len="med"/>
+            <a:tailEnd type="none" w="med" len="med"/>
+          </a:ln>
+          <a:effectLst>
+            <a:outerShdw blurRad="50800" dist="38100" dir="2700000" algn="tl" rotWithShape="0">
+              <a:prstClr val="black">
+                <a:alpha val="40000"/>
+              </a:prstClr>
+            </a:outerShdw>
+          </a:effectLst>
+        </p:spPr>
+        <p:style>
+          <a:lnRef idx="0">
+            <a:scrgbClr r="0" g="0" b="0"/>
+          </a:lnRef>
+          <a:fillRef idx="0">
+            <a:scrgbClr r="0" g="0" b="0"/>
+          </a:fillRef>
+          <a:effectRef idx="0">
+            <a:scrgbClr r="0" g="0" b="0"/>
+          </a:effectRef>
+          <a:fontRef idx="minor">
+            <a:schemeClr val="dk1"/>
+          </a:fontRef>
+        </p:style>
+        <p:txBody>
+          <a:bodyPr rtlCol="0" anchor="ctr"/>
+          <a:lstStyle/>
+          <a:p>
+            <a:pPr algn="ctr"/>
+            <a:endParaRPr lang="en-US" dirty="0"/>
+          </a:p>
+        </p:txBody>
+      </p:sp>
+      <p:sp>
+        <p:nvSpPr>
+          <p:cNvPr id="11" name="Rounded Rectangle 10"/>
+          <p:cNvSpPr/>
+          <p:nvPr/>
+        </p:nvSpPr>
+        <p:spPr>
+          <a:xfrm>
+            <a:off x="6463475" y="2657018"/>
+            <a:ext cx="2219696" cy="1508760"/>
           </a:xfrm>
           <a:prstGeom prst="roundRect">
             <a:avLst/>
@@ -3512,99 +3830,15 @@
           </a:p>
         </p:txBody>
       </p:sp>
-      <p:pic>
-        <p:nvPicPr>
-          <p:cNvPr id="9" name="Picture 8"/>
-          <p:cNvPicPr>
-            <a:picLocks noChangeAspect="1"/>
-          </p:cNvPicPr>
-          <p:nvPr/>
-        </p:nvPicPr>
-        <p:blipFill rotWithShape="1">
-          <a:blip r:embed="rId3">
-            <a:extLst>
-              <a:ext uri="{28A0092B-C50C-407E-A947-70E740481C1C}">
-                <a14:useLocalDpi xmlns:a14="http://schemas.microsoft.com/office/drawing/2010/main" val="0"/>
-              </a:ext>
-            </a:extLst>
-          </a:blip>
-          <a:srcRect l="3730" t="3857" r="4473" b="4695"/>
-          <a:stretch/>
-        </p:blipFill>
-        <p:spPr>
-          <a:xfrm>
-            <a:off x="4074319" y="2677974"/>
-            <a:ext cx="1009678" cy="1005840"/>
-          </a:xfrm>
-          <a:prstGeom prst="rect">
-            <a:avLst/>
-          </a:prstGeom>
-        </p:spPr>
-      </p:pic>
-      <p:sp>
-        <p:nvSpPr>
-          <p:cNvPr id="10" name="Rounded Rectangle 9"/>
+      <p:sp>
+        <p:nvSpPr>
+          <p:cNvPr id="12" name="Rounded Rectangle 11"/>
           <p:cNvSpPr/>
           <p:nvPr/>
         </p:nvSpPr>
         <p:spPr>
           <a:xfrm>
-            <a:off x="3494346" y="2564985"/>
-            <a:ext cx="2219696" cy="1508760"/>
-          </a:xfrm>
-          <a:prstGeom prst="roundRect">
-            <a:avLst/>
-          </a:prstGeom>
-          <a:noFill/>
-          <a:ln w="38100" cap="flat" cmpd="sng" algn="ctr">
-            <a:solidFill>
-              <a:schemeClr val="tx1"/>
-            </a:solidFill>
-            <a:prstDash val="solid"/>
-            <a:round/>
-            <a:headEnd type="none" w="med" len="med"/>
-            <a:tailEnd type="none" w="med" len="med"/>
-          </a:ln>
-          <a:effectLst>
-            <a:outerShdw blurRad="50800" dist="38100" dir="2700000" algn="tl" rotWithShape="0">
-              <a:prstClr val="black">
-                <a:alpha val="40000"/>
-              </a:prstClr>
-            </a:outerShdw>
-          </a:effectLst>
-        </p:spPr>
-        <p:style>
-          <a:lnRef idx="0">
-            <a:scrgbClr r="0" g="0" b="0"/>
-          </a:lnRef>
-          <a:fillRef idx="0">
-            <a:scrgbClr r="0" g="0" b="0"/>
-          </a:fillRef>
-          <a:effectRef idx="0">
-            <a:scrgbClr r="0" g="0" b="0"/>
-          </a:effectRef>
-          <a:fontRef idx="minor">
-            <a:schemeClr val="dk1"/>
-          </a:fontRef>
-        </p:style>
-        <p:txBody>
-          <a:bodyPr rtlCol="0" anchor="ctr"/>
-          <a:lstStyle/>
-          <a:p>
-            <a:pPr algn="ctr"/>
-            <a:endParaRPr lang="en-US" dirty="0"/>
-          </a:p>
-        </p:txBody>
-      </p:sp>
-      <p:sp>
-        <p:nvSpPr>
-          <p:cNvPr id="11" name="Rounded Rectangle 10"/>
-          <p:cNvSpPr/>
-          <p:nvPr/>
-        </p:nvSpPr>
-        <p:spPr>
-          <a:xfrm>
-            <a:off x="6463475" y="2580818"/>
+            <a:off x="9419307" y="2646682"/>
             <a:ext cx="2219696" cy="1508760"/>
           </a:xfrm>
           <a:prstGeom prst="roundRect">
@@ -3651,61 +3885,6 @@
           </a:p>
         </p:txBody>
       </p:sp>
-      <p:sp>
-        <p:nvSpPr>
-          <p:cNvPr id="12" name="Rounded Rectangle 11"/>
-          <p:cNvSpPr/>
-          <p:nvPr/>
-        </p:nvSpPr>
-        <p:spPr>
-          <a:xfrm>
-            <a:off x="9449790" y="2564985"/>
-            <a:ext cx="2219696" cy="1508760"/>
-          </a:xfrm>
-          <a:prstGeom prst="roundRect">
-            <a:avLst/>
-          </a:prstGeom>
-          <a:noFill/>
-          <a:ln w="38100" cap="flat" cmpd="sng" algn="ctr">
-            <a:solidFill>
-              <a:schemeClr val="dk1"/>
-            </a:solidFill>
-            <a:prstDash val="solid"/>
-            <a:round/>
-            <a:headEnd type="none" w="med" len="med"/>
-            <a:tailEnd type="none" w="med" len="med"/>
-          </a:ln>
-          <a:effectLst>
-            <a:outerShdw blurRad="50800" dist="38100" dir="2700000" algn="tl" rotWithShape="0">
-              <a:prstClr val="black">
-                <a:alpha val="40000"/>
-              </a:prstClr>
-            </a:outerShdw>
-          </a:effectLst>
-        </p:spPr>
-        <p:style>
-          <a:lnRef idx="0">
-            <a:scrgbClr r="0" g="0" b="0"/>
-          </a:lnRef>
-          <a:fillRef idx="0">
-            <a:scrgbClr r="0" g="0" b="0"/>
-          </a:fillRef>
-          <a:effectRef idx="0">
-            <a:scrgbClr r="0" g="0" b="0"/>
-          </a:effectRef>
-          <a:fontRef idx="minor">
-            <a:schemeClr val="dk1"/>
-          </a:fontRef>
-        </p:style>
-        <p:txBody>
-          <a:bodyPr rtlCol="0" anchor="ctr"/>
-          <a:lstStyle/>
-          <a:p>
-            <a:pPr algn="ctr"/>
-            <a:endParaRPr lang="en-US" dirty="0"/>
-          </a:p>
-        </p:txBody>
-      </p:sp>
       <p:pic>
         <p:nvPicPr>
           <p:cNvPr id="13" name="Picture 12"/>
@@ -3727,7 +3906,7 @@
         </p:blipFill>
         <p:spPr>
           <a:xfrm>
-            <a:off x="7065169" y="2677974"/>
+            <a:off x="7065169" y="2754174"/>
             <a:ext cx="1000236" cy="1005840"/>
           </a:xfrm>
           <a:prstGeom prst="rect">
@@ -3757,7 +3936,7 @@
         </p:blipFill>
         <p:spPr>
           <a:xfrm>
-            <a:off x="10043012" y="2677974"/>
+            <a:off x="10043012" y="2754174"/>
             <a:ext cx="1005840" cy="1005840"/>
           </a:xfrm>
           <a:prstGeom prst="rect">
@@ -3787,7 +3966,7 @@
         </p:blipFill>
         <p:spPr>
           <a:xfrm>
-            <a:off x="1960677" y="1306281"/>
+            <a:off x="1960677" y="1420581"/>
             <a:ext cx="731520" cy="731520"/>
           </a:xfrm>
           <a:prstGeom prst="rect">
@@ -3863,8 +4042,8 @@
         </p:nvSpPr>
         <p:spPr>
           <a:xfrm>
-            <a:off x="3004457" y="1330557"/>
-            <a:ext cx="7434943" cy="769441"/>
+            <a:off x="3004457" y="1301982"/>
+            <a:ext cx="7434943" cy="1046440"/>
           </a:xfrm>
           <a:prstGeom prst="rect">
             <a:avLst/>
@@ -3885,7 +4064,21 @@
           <a:p>
             <a:r>
               <a:rPr lang="en-US" b="1" dirty="0" smtClean="0"/>
-              <a:t> - Streamline water supply forecasts</a:t>
+              <a:t> - Streamline water supply </a:t>
+            </a:r>
+            <a:r>
+              <a:rPr lang="en-US" b="1" dirty="0" smtClean="0"/>
+              <a:t>forecasts</a:t>
+            </a:r>
+          </a:p>
+          <a:p>
+            <a:r>
+              <a:rPr lang="en-US" b="1" dirty="0"/>
+              <a:t> </a:t>
+            </a:r>
+            <a:r>
+              <a:rPr lang="en-US" b="1" dirty="0" smtClean="0"/>
+              <a:t>- ASO integration</a:t>
             </a:r>
             <a:endParaRPr lang="en-US" b="1" dirty="0"/>
           </a:p>
@@ -3899,7 +4092,7 @@
         </p:nvSpPr>
         <p:spPr>
           <a:xfrm>
-            <a:off x="485183" y="3657994"/>
+            <a:off x="485183" y="3734194"/>
             <a:ext cx="2219696" cy="430887"/>
           </a:xfrm>
           <a:prstGeom prst="rect">
@@ -3918,7 +4111,6 @@
               <a:rPr lang="en-US" sz="2200" b="1" dirty="0" smtClean="0"/>
               <a:t>Data</a:t>
             </a:r>
-            <a:endParaRPr lang="en-US" sz="2200" b="1" dirty="0" smtClean="0"/>
           </a:p>
         </p:txBody>
       </p:sp>
@@ -3930,7 +4122,7 @@
         </p:nvSpPr>
         <p:spPr>
           <a:xfrm>
-            <a:off x="3494346" y="4614828"/>
+            <a:off x="3494346" y="4691028"/>
             <a:ext cx="2219696" cy="1400383"/>
           </a:xfrm>
           <a:prstGeom prst="rect">
@@ -3950,11 +4142,7 @@
             </a:pPr>
             <a:r>
               <a:rPr lang="en-US" sz="1700" b="1" dirty="0" smtClean="0"/>
-              <a:t>Domain </a:t>
-            </a:r>
-            <a:r>
-              <a:rPr lang="en-US" sz="1700" b="1" dirty="0" smtClean="0"/>
-              <a:t>interpolation</a:t>
+              <a:t>Domain interpolation</a:t>
             </a:r>
           </a:p>
           <a:p>
@@ -3964,11 +4152,7 @@
             </a:pPr>
             <a:r>
               <a:rPr lang="en-US" sz="1700" b="1" dirty="0" smtClean="0"/>
-              <a:t>Point/gridded data to </a:t>
-            </a:r>
-            <a:r>
-              <a:rPr lang="en-US" sz="1700" b="1" dirty="0" smtClean="0"/>
-              <a:t>domain</a:t>
+              <a:t>Point/gridded data to domain</a:t>
             </a:r>
           </a:p>
           <a:p>
@@ -3980,7 +4164,6 @@
               <a:rPr lang="en-US" sz="1700" b="1" dirty="0" smtClean="0"/>
               <a:t>Flexible framework</a:t>
             </a:r>
-            <a:endParaRPr lang="en-US" sz="1700" b="1" dirty="0" smtClean="0"/>
           </a:p>
         </p:txBody>
       </p:sp>
@@ -3992,7 +4175,7 @@
         </p:nvSpPr>
         <p:spPr>
           <a:xfrm>
-            <a:off x="6491350" y="4594902"/>
+            <a:off x="6491350" y="4671102"/>
             <a:ext cx="2219696" cy="615553"/>
           </a:xfrm>
           <a:prstGeom prst="rect">
@@ -4036,7 +4219,7 @@
         </p:nvSpPr>
         <p:spPr>
           <a:xfrm>
-            <a:off x="9419307" y="4579662"/>
+            <a:off x="9419307" y="4655862"/>
             <a:ext cx="2219696" cy="1138773"/>
           </a:xfrm>
           <a:prstGeom prst="rect">
@@ -4056,11 +4239,7 @@
             </a:pPr>
             <a:r>
               <a:rPr lang="en-US" sz="1700" b="1" dirty="0" smtClean="0"/>
-              <a:t>Process </a:t>
-            </a:r>
-            <a:r>
-              <a:rPr lang="en-US" sz="1700" b="1" dirty="0" smtClean="0"/>
-              <a:t>outputs</a:t>
+              <a:t>Process outputs</a:t>
             </a:r>
           </a:p>
           <a:p>
@@ -4070,11 +4249,7 @@
             </a:pPr>
             <a:r>
               <a:rPr lang="en-US" sz="1700" b="1" dirty="0" smtClean="0"/>
-              <a:t>Analytics and </a:t>
-            </a:r>
-            <a:r>
-              <a:rPr lang="en-US" sz="1700" b="1" dirty="0" smtClean="0"/>
-              <a:t>insights</a:t>
+              <a:t>Analytics and insights</a:t>
             </a:r>
           </a:p>
           <a:p>
@@ -4086,92 +4261,6 @@
               <a:rPr lang="en-US" sz="1700" b="1" dirty="0" smtClean="0"/>
               <a:t>Summary reports</a:t>
             </a:r>
-            <a:endParaRPr lang="en-US" sz="1700" b="1" dirty="0" smtClean="0"/>
-          </a:p>
-        </p:txBody>
-      </p:sp>
-      <p:sp>
-        <p:nvSpPr>
-          <p:cNvPr id="24" name="Rectangle 23"/>
-          <p:cNvSpPr/>
-          <p:nvPr/>
-        </p:nvSpPr>
-        <p:spPr>
-          <a:xfrm>
-            <a:off x="239486" y="2352569"/>
-            <a:ext cx="11832771" cy="4363820"/>
-          </a:xfrm>
-          <a:prstGeom prst="rect">
-            <a:avLst/>
-          </a:prstGeom>
-          <a:noFill/>
-          <a:ln w="38100">
-            <a:solidFill>
-              <a:srgbClr val="C00000"/>
-            </a:solidFill>
-            <a:prstDash val="dash"/>
-          </a:ln>
-        </p:spPr>
-        <p:style>
-          <a:lnRef idx="2">
-            <a:schemeClr val="accent2"/>
-          </a:lnRef>
-          <a:fillRef idx="1">
-            <a:schemeClr val="lt1"/>
-          </a:fillRef>
-          <a:effectRef idx="0">
-            <a:schemeClr val="accent2"/>
-          </a:effectRef>
-          <a:fontRef idx="minor">
-            <a:schemeClr val="dk1"/>
-          </a:fontRef>
-        </p:style>
-        <p:txBody>
-          <a:bodyPr rtlCol="0" anchor="ctr"/>
-          <a:lstStyle/>
-          <a:p>
-            <a:pPr algn="ctr"/>
-            <a:endParaRPr lang="en-US" dirty="0"/>
-          </a:p>
-        </p:txBody>
-      </p:sp>
-      <p:sp>
-        <p:nvSpPr>
-          <p:cNvPr id="25" name="TextBox 24"/>
-          <p:cNvSpPr txBox="1"/>
-          <p:nvPr/>
-        </p:nvSpPr>
-        <p:spPr>
-          <a:xfrm>
-            <a:off x="447303" y="2132272"/>
-            <a:ext cx="2086982" cy="400110"/>
-          </a:xfrm>
-          <a:prstGeom prst="rect">
-            <a:avLst/>
-          </a:prstGeom>
-          <a:solidFill>
-            <a:schemeClr val="bg1"/>
-          </a:solidFill>
-        </p:spPr>
-        <p:txBody>
-          <a:bodyPr wrap="none" rtlCol="0">
-            <a:spAutoFit/>
-          </a:bodyPr>
-          <a:lstStyle/>
-          <a:p>
-            <a:r>
-              <a:rPr lang="en-US" sz="2000" b="1" dirty="0" smtClean="0">
-                <a:solidFill>
-                  <a:srgbClr val="C00000"/>
-                </a:solidFill>
-              </a:rPr>
-              <a:t>Core Components</a:t>
-            </a:r>
-            <a:endParaRPr lang="en-US" sz="2000" b="1" dirty="0">
-              <a:solidFill>
-                <a:srgbClr val="C00000"/>
-              </a:solidFill>
-            </a:endParaRPr>
           </a:p>
         </p:txBody>
       </p:sp>
@@ -4263,7 +4352,7 @@
         </p:nvSpPr>
         <p:spPr>
           <a:xfrm>
-            <a:off x="485183" y="4594902"/>
+            <a:off x="485183" y="4671102"/>
             <a:ext cx="2219696" cy="615553"/>
           </a:xfrm>
           <a:prstGeom prst="rect">
@@ -4295,7 +4384,6 @@
               <a:rPr lang="en-US" sz="1700" b="1" dirty="0" smtClean="0"/>
               <a:t>Auto cleaning</a:t>
             </a:r>
-            <a:endParaRPr lang="en-US" sz="1700" b="1" dirty="0" smtClean="0"/>
           </a:p>
         </p:txBody>
       </p:sp>
@@ -4307,7 +4395,7 @@
         </p:nvSpPr>
         <p:spPr>
           <a:xfrm>
-            <a:off x="3491015" y="3683814"/>
+            <a:off x="3491015" y="3760014"/>
             <a:ext cx="2219696" cy="430887"/>
           </a:xfrm>
           <a:prstGeom prst="rect">
@@ -4337,7 +4425,7 @@
         </p:nvSpPr>
         <p:spPr>
           <a:xfrm>
-            <a:off x="6491350" y="3658691"/>
+            <a:off x="6491350" y="3734891"/>
             <a:ext cx="2219696" cy="430887"/>
           </a:xfrm>
           <a:prstGeom prst="rect">
@@ -4356,7 +4444,6 @@
               <a:rPr lang="en-US" sz="2200" b="1" dirty="0" smtClean="0"/>
               <a:t>Models</a:t>
             </a:r>
-            <a:endParaRPr lang="en-US" sz="2200" b="1" dirty="0" smtClean="0"/>
           </a:p>
         </p:txBody>
       </p:sp>
@@ -4368,7 +4455,7 @@
         </p:nvSpPr>
         <p:spPr>
           <a:xfrm>
-            <a:off x="9449790" y="3657993"/>
+            <a:off x="9449790" y="3734193"/>
             <a:ext cx="2219696" cy="430887"/>
           </a:xfrm>
           <a:prstGeom prst="rect">
@@ -4387,7 +4474,6 @@
               <a:rPr lang="en-US" sz="2200" b="1" dirty="0" smtClean="0"/>
               <a:t>Data Analysis</a:t>
             </a:r>
-            <a:endParaRPr lang="en-US" sz="2200" b="1" dirty="0" smtClean="0"/>
           </a:p>
         </p:txBody>
       </p:sp>
@@ -4399,7 +4485,7 @@
         </p:nvSpPr>
         <p:spPr>
           <a:xfrm>
-            <a:off x="490847" y="4241282"/>
+            <a:off x="490847" y="4317482"/>
             <a:ext cx="2219696" cy="1013256"/>
           </a:xfrm>
           <a:prstGeom prst="roundRect">
@@ -4454,7 +4540,7 @@
         </p:nvSpPr>
         <p:spPr>
           <a:xfrm>
-            <a:off x="490847" y="5734912"/>
+            <a:off x="490847" y="5811112"/>
             <a:ext cx="2219696" cy="877163"/>
           </a:xfrm>
           <a:prstGeom prst="rect">
@@ -4474,11 +4560,7 @@
             </a:pPr>
             <a:r>
               <a:rPr lang="en-US" sz="1700" b="1" dirty="0" smtClean="0"/>
-              <a:t>WRF </a:t>
-            </a:r>
-            <a:r>
-              <a:rPr lang="en-US" sz="1700" b="1" dirty="0" smtClean="0"/>
-              <a:t>10 day </a:t>
+              <a:t>WRF 10 day </a:t>
             </a:r>
             <a:r>
               <a:rPr lang="en-US" sz="1700" b="1" dirty="0" err="1" smtClean="0"/>
@@ -4507,7 +4589,7 @@
         </p:nvSpPr>
         <p:spPr>
           <a:xfrm>
-            <a:off x="484566" y="5379720"/>
+            <a:off x="484566" y="5455920"/>
             <a:ext cx="2219696" cy="1230677"/>
           </a:xfrm>
           <a:prstGeom prst="roundRect">
@@ -4562,7 +4644,7 @@
         </p:nvSpPr>
         <p:spPr>
           <a:xfrm>
-            <a:off x="485183" y="4285935"/>
+            <a:off x="485183" y="4362135"/>
             <a:ext cx="2219696" cy="400110"/>
           </a:xfrm>
           <a:prstGeom prst="rect">
@@ -4581,7 +4663,6 @@
               <a:rPr lang="en-US" sz="2000" b="1" dirty="0" smtClean="0"/>
               <a:t>Weather DB</a:t>
             </a:r>
-            <a:endParaRPr lang="en-US" sz="2000" b="1" dirty="0" smtClean="0"/>
           </a:p>
         </p:txBody>
       </p:sp>
@@ -4593,7 +4674,7 @@
         </p:nvSpPr>
         <p:spPr>
           <a:xfrm>
-            <a:off x="485183" y="5421315"/>
+            <a:off x="485183" y="5497515"/>
             <a:ext cx="2219696" cy="400110"/>
           </a:xfrm>
           <a:prstGeom prst="rect">
@@ -4612,7 +4693,6 @@
               <a:rPr lang="en-US" sz="2000" b="1" dirty="0" smtClean="0"/>
               <a:t>Weather FX</a:t>
             </a:r>
-            <a:endParaRPr lang="en-US" sz="2000" b="1" dirty="0" smtClean="0"/>
           </a:p>
         </p:txBody>
       </p:sp>
@@ -4624,7 +4704,7 @@
         </p:nvSpPr>
         <p:spPr>
           <a:xfrm>
-            <a:off x="3494346" y="4241282"/>
+            <a:off x="3494346" y="4317482"/>
             <a:ext cx="2219696" cy="1773929"/>
           </a:xfrm>
           <a:prstGeom prst="roundRect">
@@ -4679,7 +4759,7 @@
         </p:nvSpPr>
         <p:spPr>
           <a:xfrm>
-            <a:off x="3494346" y="4285935"/>
+            <a:off x="3494346" y="4362135"/>
             <a:ext cx="2219696" cy="400110"/>
           </a:xfrm>
           <a:prstGeom prst="rect">
@@ -4698,7 +4778,6 @@
               <a:rPr lang="en-US" sz="2000" b="1" dirty="0" smtClean="0"/>
               <a:t>SMRF</a:t>
             </a:r>
-            <a:endParaRPr lang="en-US" sz="2000" b="1" dirty="0" smtClean="0"/>
           </a:p>
         </p:txBody>
       </p:sp>
@@ -4710,7 +4789,7 @@
         </p:nvSpPr>
         <p:spPr>
           <a:xfrm>
-            <a:off x="6491350" y="4241978"/>
+            <a:off x="6491350" y="4318178"/>
             <a:ext cx="2219696" cy="1012560"/>
           </a:xfrm>
           <a:prstGeom prst="roundRect">
@@ -4765,7 +4844,7 @@
         </p:nvSpPr>
         <p:spPr>
           <a:xfrm>
-            <a:off x="6491350" y="4285935"/>
+            <a:off x="6491350" y="4362135"/>
             <a:ext cx="2219696" cy="400110"/>
           </a:xfrm>
           <a:prstGeom prst="rect">
@@ -4784,7 +4863,6 @@
               <a:rPr lang="en-US" sz="2000" b="1" dirty="0" smtClean="0"/>
               <a:t>IPW</a:t>
             </a:r>
-            <a:endParaRPr lang="en-US" sz="2000" b="1" dirty="0" smtClean="0"/>
           </a:p>
         </p:txBody>
       </p:sp>
@@ -4796,8 +4874,8 @@
         </p:nvSpPr>
         <p:spPr>
           <a:xfrm>
-            <a:off x="6463475" y="5716902"/>
-            <a:ext cx="2219696" cy="877163"/>
+            <a:off x="6463475" y="5878827"/>
+            <a:ext cx="2219696" cy="615553"/>
           </a:xfrm>
           <a:prstGeom prst="rect">
             <a:avLst/>
@@ -4816,27 +4894,13 @@
             </a:pPr>
             <a:r>
               <a:rPr lang="en-US" sz="1700" b="1" dirty="0" smtClean="0"/>
-              <a:t>Snow </a:t>
+              <a:t>Snow and/or hydrologic </a:t>
             </a:r>
             <a:r>
               <a:rPr lang="en-US" sz="1700" b="1" dirty="0" smtClean="0"/>
-              <a:t>and/or hydrologic model</a:t>
-            </a:r>
-          </a:p>
-          <a:p>
-            <a:pPr marL="282575" indent="-168275">
-              <a:buFont typeface="Arial" panose="020B0604020202020204" pitchFamily="34" charset="0"/>
-              <a:buChar char="•"/>
-            </a:pPr>
-            <a:r>
-              <a:rPr lang="en-US" sz="1700" b="1" dirty="0" smtClean="0"/>
-              <a:t>ASO </a:t>
-            </a:r>
-            <a:r>
-              <a:rPr lang="en-US" sz="1700" b="1" dirty="0" smtClean="0"/>
-              <a:t>integration</a:t>
-            </a:r>
-            <a:endParaRPr lang="en-US" b="1" dirty="0"/>
+              <a:t>model</a:t>
+            </a:r>
+            <a:endParaRPr lang="en-US" sz="1700" b="1" dirty="0" smtClean="0"/>
           </a:p>
         </p:txBody>
       </p:sp>
@@ -4848,8 +4912,8 @@
         </p:nvSpPr>
         <p:spPr>
           <a:xfrm>
-            <a:off x="6491350" y="5357573"/>
-            <a:ext cx="2219696" cy="1274969"/>
+            <a:off x="6491350" y="5433773"/>
+            <a:ext cx="2219696" cy="1060607"/>
           </a:xfrm>
           <a:prstGeom prst="roundRect">
             <a:avLst/>
@@ -4903,7 +4967,7 @@
         </p:nvSpPr>
         <p:spPr>
           <a:xfrm>
-            <a:off x="6491350" y="5423368"/>
+            <a:off x="6491350" y="5499568"/>
             <a:ext cx="2219696" cy="400110"/>
           </a:xfrm>
           <a:prstGeom prst="rect">
@@ -4934,7 +4998,7 @@
         </p:nvSpPr>
         <p:spPr>
           <a:xfrm>
-            <a:off x="9449790" y="4241978"/>
+            <a:off x="9449790" y="4318178"/>
             <a:ext cx="2219696" cy="1508760"/>
           </a:xfrm>
           <a:prstGeom prst="roundRect">
@@ -4989,7 +5053,7 @@
         </p:nvSpPr>
         <p:spPr>
           <a:xfrm>
-            <a:off x="9449790" y="4285935"/>
+            <a:off x="9449790" y="4362135"/>
             <a:ext cx="2219696" cy="400110"/>
           </a:xfrm>
           <a:prstGeom prst="rect">
@@ -5008,7 +5072,108 @@
               <a:rPr lang="en-US" sz="2000" b="1" dirty="0" smtClean="0"/>
               <a:t>SNOWAV</a:t>
             </a:r>
-            <a:endParaRPr lang="en-US" sz="2000" b="1" dirty="0" smtClean="0"/>
+          </a:p>
+        </p:txBody>
+      </p:sp>
+      <p:sp>
+        <p:nvSpPr>
+          <p:cNvPr id="5" name="Rounded Rectangle 4"/>
+          <p:cNvSpPr/>
+          <p:nvPr/>
+        </p:nvSpPr>
+        <p:spPr>
+          <a:xfrm>
+            <a:off x="1654628" y="1259177"/>
+            <a:ext cx="8937171" cy="1051560"/>
+          </a:xfrm>
+          <a:prstGeom prst="roundRect">
+            <a:avLst/>
+          </a:prstGeom>
+          <a:noFill/>
+          <a:ln w="28575"/>
+          <a:effectLst>
+            <a:outerShdw blurRad="50800" dist="38100" dir="2700000" algn="tl" rotWithShape="0">
+              <a:prstClr val="black">
+                <a:alpha val="40000"/>
+              </a:prstClr>
+            </a:outerShdw>
+          </a:effectLst>
+        </p:spPr>
+        <p:style>
+          <a:lnRef idx="2">
+            <a:schemeClr val="dk1"/>
+          </a:lnRef>
+          <a:fillRef idx="1">
+            <a:schemeClr val="lt1"/>
+          </a:fillRef>
+          <a:effectRef idx="0">
+            <a:schemeClr val="dk1"/>
+          </a:effectRef>
+          <a:fontRef idx="minor">
+            <a:schemeClr val="dk1"/>
+          </a:fontRef>
+        </p:style>
+        <p:txBody>
+          <a:bodyPr rtlCol="0" anchor="ctr"/>
+          <a:lstStyle/>
+          <a:p>
+            <a:pPr algn="ctr"/>
+            <a:endParaRPr lang="en-US" sz="2400" b="1" dirty="0"/>
+          </a:p>
+        </p:txBody>
+      </p:sp>
+      <p:sp>
+        <p:nvSpPr>
+          <p:cNvPr id="8" name="Rounded Rectangle 7"/>
+          <p:cNvSpPr/>
+          <p:nvPr/>
+        </p:nvSpPr>
+        <p:spPr>
+          <a:xfrm>
+            <a:off x="490847" y="2657018"/>
+            <a:ext cx="2219696" cy="1508063"/>
+          </a:xfrm>
+          <a:prstGeom prst="roundRect">
+            <a:avLst/>
+          </a:prstGeom>
+          <a:noFill/>
+          <a:ln w="38100" cap="flat" cmpd="sng" algn="ctr">
+            <a:solidFill>
+              <a:schemeClr val="dk1"/>
+            </a:solidFill>
+            <a:prstDash val="solid"/>
+            <a:round/>
+            <a:headEnd type="none" w="med" len="med"/>
+            <a:tailEnd type="none" w="med" len="med"/>
+          </a:ln>
+          <a:effectLst>
+            <a:outerShdw blurRad="50800" dist="38100" dir="2700000" algn="tl" rotWithShape="0">
+              <a:prstClr val="black">
+                <a:alpha val="40000"/>
+              </a:prstClr>
+            </a:outerShdw>
+          </a:effectLst>
+        </p:spPr>
+        <p:style>
+          <a:lnRef idx="0">
+            <a:scrgbClr r="0" g="0" b="0"/>
+          </a:lnRef>
+          <a:fillRef idx="0">
+            <a:scrgbClr r="0" g="0" b="0"/>
+          </a:fillRef>
+          <a:effectRef idx="0">
+            <a:scrgbClr r="0" g="0" b="0"/>
+          </a:effectRef>
+          <a:fontRef idx="minor">
+            <a:schemeClr val="dk1"/>
+          </a:fontRef>
+        </p:style>
+        <p:txBody>
+          <a:bodyPr rtlCol="0" anchor="ctr"/>
+          <a:lstStyle/>
+          <a:p>
+            <a:pPr algn="ctr"/>
+            <a:endParaRPr lang="en-US" dirty="0"/>
           </a:p>
         </p:txBody>
       </p:sp>
@@ -5287,7 +5452,7 @@
   <a:extraClrSchemeLst/>
   <a:extLst>
     <a:ext uri="{05A4C25C-085E-4340-85A3-A5531E510DB2}">
-      <thm15:themeFamily xmlns:thm15="http://schemas.microsoft.com/office/thememl/2012/main" xmlns="" name="Office Theme" id="{62F939B6-93AF-4DB8-9C6B-D6C7DFDC589F}" vid="{4A3C46E8-61CC-4603-A589-7422A47A8E4A}"/>
+      <thm15:themeFamily xmlns="" xmlns:thm15="http://schemas.microsoft.com/office/thememl/2012/main" name="Office Theme" id="{62F939B6-93AF-4DB8-9C6B-D6C7DFDC589F}" vid="{4A3C46E8-61CC-4603-A589-7422A47A8E4A}"/>
     </a:ext>
   </a:extLst>
 </a:theme>
@@ -5548,7 +5713,7 @@
   <a:extraClrSchemeLst/>
   <a:extLst>
     <a:ext uri="{05A4C25C-085E-4340-85A3-A5531E510DB2}">
-      <thm15:themeFamily xmlns:thm15="http://schemas.microsoft.com/office/thememl/2012/main" xmlns="" name="Office Theme" id="{62F939B6-93AF-4DB8-9C6B-D6C7DFDC589F}" vid="{4A3C46E8-61CC-4603-A589-7422A47A8E4A}"/>
+      <thm15:themeFamily xmlns="" xmlns:thm15="http://schemas.microsoft.com/office/thememl/2012/main" name="Office Theme" id="{62F939B6-93AF-4DB8-9C6B-D6C7DFDC589F}" vid="{4A3C46E8-61CC-4603-A589-7422A47A8E4A}"/>
     </a:ext>
   </a:extLst>
 </a:theme>

</xml_diff>